<commit_message>
progression rapport + progression powerpoint
</commit_message>
<xml_diff>
--- a/ressources/CDA_Projet_Repotech_Yoan_Deconinck.pptx
+++ b/ressources/CDA_Projet_Repotech_Yoan_Deconinck.pptx
@@ -5,13 +5,20 @@
     <p:sldMasterId id="2147483648" r:id="rId1"/>
   </p:sldMasterIdLst>
   <p:notesMasterIdLst>
-    <p:notesMasterId r:id="rId6"/>
+    <p:notesMasterId r:id="rId13"/>
   </p:notesMasterIdLst>
   <p:sldIdLst>
     <p:sldId id="256" r:id="rId2"/>
     <p:sldId id="259" r:id="rId3"/>
     <p:sldId id="258" r:id="rId4"/>
-    <p:sldId id="257" r:id="rId5"/>
+    <p:sldId id="262" r:id="rId5"/>
+    <p:sldId id="263" r:id="rId6"/>
+    <p:sldId id="257" r:id="rId7"/>
+    <p:sldId id="260" r:id="rId8"/>
+    <p:sldId id="264" r:id="rId9"/>
+    <p:sldId id="261" r:id="rId10"/>
+    <p:sldId id="265" r:id="rId11"/>
+    <p:sldId id="266" r:id="rId12"/>
   </p:sldIdLst>
   <p:sldSz cx="12192000" cy="6858000"/>
   <p:notesSz cx="6858000" cy="9144000"/>
@@ -200,7 +207,7 @@
           <a:p>
             <a:fld id="{9917A500-0574-4A15-95B2-4ED4DF856D10}" type="datetimeFigureOut">
               <a:rPr lang="fr-FR" smtClean="0"/>
-              <a:t>30/05/2023</a:t>
+              <a:t>01/06/2023</a:t>
             </a:fld>
             <a:endParaRPr lang="fr-FR"/>
           </a:p>
@@ -634,9 +641,9 @@
             </a:lvl1pPr>
           </a:lstStyle>
           <a:p>
-            <a:fld id="{ED6CC993-2B28-4027-9C2E-2CF98E7C4B19}" type="datetime1">
+            <a:fld id="{AE3BC510-9AD2-480F-946F-812144CA2311}" type="datetime1">
               <a:rPr lang="en-US" smtClean="0"/>
-              <a:t>5/30/2023</a:t>
+              <a:t>6/1/2023</a:t>
             </a:fld>
             <a:endParaRPr lang="en-US" dirty="0"/>
           </a:p>
@@ -960,9 +967,9 @@
           <a:bodyPr/>
           <a:lstStyle/>
           <a:p>
-            <a:fld id="{850E89D5-ABA1-49C9-940E-86C15CEF7E1C}" type="datetime1">
+            <a:fld id="{B724DF62-1B67-4E6D-BC76-5B2E23E31DE9}" type="datetime1">
               <a:rPr lang="en-US" smtClean="0"/>
-              <a:t>5/30/2023</a:t>
+              <a:t>6/1/2023</a:t>
             </a:fld>
             <a:endParaRPr lang="en-US" dirty="0"/>
           </a:p>
@@ -1135,9 +1142,9 @@
           <a:bodyPr/>
           <a:lstStyle/>
           <a:p>
-            <a:fld id="{4A6A397C-31A8-4F9E-B79F-01F91077CB1D}" type="datetime1">
+            <a:fld id="{45B7B551-8497-4EE7-80D0-C0C7AE0BDAC3}" type="datetime1">
               <a:rPr lang="en-US" smtClean="0"/>
-              <a:t>5/30/2023</a:t>
+              <a:t>6/1/2023</a:t>
             </a:fld>
             <a:endParaRPr lang="en-US" dirty="0"/>
           </a:p>
@@ -1300,9 +1307,9 @@
           <a:bodyPr/>
           <a:lstStyle/>
           <a:p>
-            <a:fld id="{B7805A9E-8D91-4660-B8A1-001854C0D031}" type="datetime1">
+            <a:fld id="{B95823FF-46D8-466B-9B25-3C04FE4DACFC}" type="datetime1">
               <a:rPr lang="en-US" smtClean="0"/>
-              <a:t>5/30/2023</a:t>
+              <a:t>6/1/2023</a:t>
             </a:fld>
             <a:endParaRPr lang="en-US" dirty="0"/>
           </a:p>
@@ -1572,9 +1579,9 @@
             </a:lvl1pPr>
           </a:lstStyle>
           <a:p>
-            <a:fld id="{2ED21B93-464C-4CEC-9B53-B3FC56813C7D}" type="datetime1">
+            <a:fld id="{3D542EFB-AC21-4098-8256-0FEB9F4F12AA}" type="datetime1">
               <a:rPr lang="en-US" smtClean="0"/>
-              <a:t>5/30/2023</a:t>
+              <a:t>6/1/2023</a:t>
             </a:fld>
             <a:endParaRPr lang="en-US" dirty="0"/>
           </a:p>
@@ -1962,9 +1969,9 @@
           <a:bodyPr/>
           <a:lstStyle/>
           <a:p>
-            <a:fld id="{CBB143BF-BC84-4BC5-B647-3F13EDFF2C98}" type="datetime1">
+            <a:fld id="{F885D306-C8A4-43A7-8353-0A2E8E90AB5C}" type="datetime1">
               <a:rPr lang="en-US" smtClean="0"/>
-              <a:t>5/30/2023</a:t>
+              <a:t>6/1/2023</a:t>
             </a:fld>
             <a:endParaRPr lang="en-US" dirty="0"/>
           </a:p>
@@ -2434,9 +2441,9 @@
           <a:bodyPr/>
           <a:lstStyle/>
           <a:p>
-            <a:fld id="{93FC52AA-EB4B-4FE7-AAF8-6863E3450A48}" type="datetime1">
+            <a:fld id="{2B6B083E-2F74-48BB-8EF9-49960B3F3058}" type="datetime1">
               <a:rPr lang="en-US" smtClean="0"/>
-              <a:t>5/30/2023</a:t>
+              <a:t>6/1/2023</a:t>
             </a:fld>
             <a:endParaRPr lang="en-US" dirty="0"/>
           </a:p>
@@ -2547,9 +2554,9 @@
           <a:bodyPr/>
           <a:lstStyle/>
           <a:p>
-            <a:fld id="{D8DB8F75-46AF-4010-9899-AEC7E48B0111}" type="datetime1">
+            <a:fld id="{9E13F5A8-DC50-4454-B8B2-A29ECA13C144}" type="datetime1">
               <a:rPr lang="en-US" smtClean="0"/>
-              <a:t>5/30/2023</a:t>
+              <a:t>6/1/2023</a:t>
             </a:fld>
             <a:endParaRPr lang="en-US" dirty="0"/>
           </a:p>
@@ -2637,9 +2644,9 @@
           <a:bodyPr/>
           <a:lstStyle/>
           <a:p>
-            <a:fld id="{ABFD5B3F-68C6-4121-8E2B-B45116874709}" type="datetime1">
+            <a:fld id="{3FDB2FD2-DBFA-4B64-B0A5-75D777391947}" type="datetime1">
               <a:rPr lang="en-US" smtClean="0"/>
-              <a:t>5/30/2023</a:t>
+              <a:t>6/1/2023</a:t>
             </a:fld>
             <a:endParaRPr lang="en-US" dirty="0"/>
           </a:p>
@@ -2978,9 +2985,9 @@
             </a:lvl1pPr>
           </a:lstStyle>
           <a:p>
-            <a:fld id="{55A75E61-B914-4C8C-B684-5570C87CAC21}" type="datetime1">
+            <a:fld id="{67A685A6-A975-4F33-8DCB-2917F2673AC4}" type="datetime1">
               <a:rPr lang="en-US" smtClean="0"/>
-              <a:t>5/30/2023</a:t>
+              <a:t>6/1/2023</a:t>
             </a:fld>
             <a:endParaRPr lang="en-US" dirty="0"/>
           </a:p>
@@ -3362,9 +3369,9 @@
             </a:lvl1pPr>
           </a:lstStyle>
           <a:p>
-            <a:fld id="{B38565A8-EF2D-42DB-88ED-B874C45F84C6}" type="datetime1">
+            <a:fld id="{66F5D41C-CC31-4372-9BD8-40139430872E}" type="datetime1">
               <a:rPr lang="en-US" smtClean="0"/>
-              <a:t>5/30/2023</a:t>
+              <a:t>6/1/2023</a:t>
             </a:fld>
             <a:endParaRPr lang="en-US" dirty="0"/>
           </a:p>
@@ -3636,9 +3643,9 @@
             </a:lvl1pPr>
           </a:lstStyle>
           <a:p>
-            <a:fld id="{F4809714-B15B-4C3A-B5D3-91C7E443D0A2}" type="datetime1">
+            <a:fld id="{0F1ED1E7-7202-47E9-92E6-A6625081A6C0}" type="datetime1">
               <a:rPr lang="en-US" smtClean="0"/>
-              <a:t>5/30/2023</a:t>
+              <a:t>6/1/2023</a:t>
             </a:fld>
             <a:endParaRPr lang="en-US" dirty="0"/>
           </a:p>
@@ -4081,7 +4088,7 @@
       </a:lvl9pPr>
     </p:otherStyle>
   </p:txStyles>
-  <p:extLst>
+  <p:extLst mod="1">
     <p:ext uri="{27BBF7A9-308A-43DC-89C8-2F10F3537804}">
       <p15:sldGuideLst xmlns:p15="http://schemas.microsoft.com/office/powerpoint/2012/main">
         <p15:guide id="3" orient="horz" pos="1368">
@@ -4283,6 +4290,193 @@
   <p:clrMapOvr>
     <a:masterClrMapping/>
   </p:clrMapOvr>
+  <p:timing>
+    <p:tnLst>
+      <p:par>
+        <p:cTn id="1" dur="indefinite" restart="never" nodeType="tmRoot"/>
+      </p:par>
+    </p:tnLst>
+  </p:timing>
+</p:sld>
+</file>
+
+<file path=ppt/slides/slide10.xml><?xml version="1.0" encoding="utf-8"?>
+<p:sld xmlns:a="http://schemas.openxmlformats.org/drawingml/2006/main" xmlns:r="http://schemas.openxmlformats.org/officeDocument/2006/relationships" xmlns:p="http://schemas.openxmlformats.org/presentationml/2006/main">
+  <p:cSld>
+    <p:spTree>
+      <p:nvGrpSpPr>
+        <p:cNvPr id="1" name=""/>
+        <p:cNvGrpSpPr/>
+        <p:nvPr/>
+      </p:nvGrpSpPr>
+      <p:grpSpPr>
+        <a:xfrm>
+          <a:off x="0" y="0"/>
+          <a:ext cx="0" cy="0"/>
+          <a:chOff x="0" y="0"/>
+          <a:chExt cx="0" cy="0"/>
+        </a:xfrm>
+      </p:grpSpPr>
+      <p:sp>
+        <p:nvSpPr>
+          <p:cNvPr id="2" name="Titre 1">
+            <a:extLst>
+              <a:ext uri="{FF2B5EF4-FFF2-40B4-BE49-F238E27FC236}">
+                <a16:creationId xmlns:a16="http://schemas.microsoft.com/office/drawing/2014/main" id="{3CCA4AA0-934F-8067-59A5-481C54A91E60}"/>
+              </a:ext>
+            </a:extLst>
+          </p:cNvPr>
+          <p:cNvSpPr>
+            <a:spLocks noGrp="1"/>
+          </p:cNvSpPr>
+          <p:nvPr>
+            <p:ph type="title"/>
+          </p:nvPr>
+        </p:nvSpPr>
+        <p:spPr/>
+        <p:txBody>
+          <a:bodyPr/>
+          <a:lstStyle/>
+          <a:p>
+            <a:r>
+              <a:rPr lang="fr-FR" dirty="0" smtClean="0"/>
+              <a:t>Tâches effectuées</a:t>
+            </a:r>
+            <a:endParaRPr lang="fr-FR" dirty="0"/>
+          </a:p>
+        </p:txBody>
+      </p:sp>
+      <p:sp>
+        <p:nvSpPr>
+          <p:cNvPr id="3" name="Espace réservé du numéro de diapositive 2"/>
+          <p:cNvSpPr>
+            <a:spLocks noGrp="1"/>
+          </p:cNvSpPr>
+          <p:nvPr>
+            <p:ph type="sldNum" sz="quarter" idx="12"/>
+          </p:nvPr>
+        </p:nvSpPr>
+        <p:spPr/>
+        <p:txBody>
+          <a:bodyPr/>
+          <a:lstStyle/>
+          <a:p>
+            <a:fld id="{69E57DC2-970A-4B3E-BB1C-7A09969E49DF}" type="slidenum">
+              <a:rPr lang="en-US" smtClean="0"/>
+              <a:pPr/>
+              <a:t>10</a:t>
+            </a:fld>
+            <a:endParaRPr lang="en-US" dirty="0"/>
+          </a:p>
+        </p:txBody>
+      </p:sp>
+    </p:spTree>
+    <p:extLst>
+      <p:ext uri="{BB962C8B-B14F-4D97-AF65-F5344CB8AC3E}">
+        <p14:creationId xmlns:p14="http://schemas.microsoft.com/office/powerpoint/2010/main" val="512589257"/>
+      </p:ext>
+    </p:extLst>
+  </p:cSld>
+  <p:clrMapOvr>
+    <a:masterClrMapping/>
+  </p:clrMapOvr>
+  <p:timing>
+    <p:tnLst>
+      <p:par>
+        <p:cTn id="1" dur="indefinite" restart="never" nodeType="tmRoot"/>
+      </p:par>
+    </p:tnLst>
+  </p:timing>
+</p:sld>
+</file>
+
+<file path=ppt/slides/slide11.xml><?xml version="1.0" encoding="utf-8"?>
+<p:sld xmlns:a="http://schemas.openxmlformats.org/drawingml/2006/main" xmlns:r="http://schemas.openxmlformats.org/officeDocument/2006/relationships" xmlns:p="http://schemas.openxmlformats.org/presentationml/2006/main">
+  <p:cSld>
+    <p:spTree>
+      <p:nvGrpSpPr>
+        <p:cNvPr id="1" name=""/>
+        <p:cNvGrpSpPr/>
+        <p:nvPr/>
+      </p:nvGrpSpPr>
+      <p:grpSpPr>
+        <a:xfrm>
+          <a:off x="0" y="0"/>
+          <a:ext cx="0" cy="0"/>
+          <a:chOff x="0" y="0"/>
+          <a:chExt cx="0" cy="0"/>
+        </a:xfrm>
+      </p:grpSpPr>
+      <p:sp>
+        <p:nvSpPr>
+          <p:cNvPr id="2" name="Titre 1">
+            <a:extLst>
+              <a:ext uri="{FF2B5EF4-FFF2-40B4-BE49-F238E27FC236}">
+                <a16:creationId xmlns:a16="http://schemas.microsoft.com/office/drawing/2014/main" id="{3CCA4AA0-934F-8067-59A5-481C54A91E60}"/>
+              </a:ext>
+            </a:extLst>
+          </p:cNvPr>
+          <p:cNvSpPr>
+            <a:spLocks noGrp="1"/>
+          </p:cNvSpPr>
+          <p:nvPr>
+            <p:ph type="title"/>
+          </p:nvPr>
+        </p:nvSpPr>
+        <p:spPr/>
+        <p:txBody>
+          <a:bodyPr/>
+          <a:lstStyle/>
+          <a:p>
+            <a:r>
+              <a:rPr lang="fr-FR" dirty="0" smtClean="0"/>
+              <a:t>conclusion</a:t>
+            </a:r>
+            <a:endParaRPr lang="fr-FR" dirty="0"/>
+          </a:p>
+        </p:txBody>
+      </p:sp>
+      <p:sp>
+        <p:nvSpPr>
+          <p:cNvPr id="3" name="Espace réservé du numéro de diapositive 2"/>
+          <p:cNvSpPr>
+            <a:spLocks noGrp="1"/>
+          </p:cNvSpPr>
+          <p:nvPr>
+            <p:ph type="sldNum" sz="quarter" idx="12"/>
+          </p:nvPr>
+        </p:nvSpPr>
+        <p:spPr/>
+        <p:txBody>
+          <a:bodyPr/>
+          <a:lstStyle/>
+          <a:p>
+            <a:fld id="{69E57DC2-970A-4B3E-BB1C-7A09969E49DF}" type="slidenum">
+              <a:rPr lang="en-US" smtClean="0"/>
+              <a:pPr/>
+              <a:t>11</a:t>
+            </a:fld>
+            <a:endParaRPr lang="en-US" dirty="0"/>
+          </a:p>
+        </p:txBody>
+      </p:sp>
+    </p:spTree>
+    <p:extLst>
+      <p:ext uri="{BB962C8B-B14F-4D97-AF65-F5344CB8AC3E}">
+        <p14:creationId xmlns:p14="http://schemas.microsoft.com/office/powerpoint/2010/main" val="832955557"/>
+      </p:ext>
+    </p:extLst>
+  </p:cSld>
+  <p:clrMapOvr>
+    <a:masterClrMapping/>
+  </p:clrMapOvr>
+  <p:timing>
+    <p:tnLst>
+      <p:par>
+        <p:cTn id="1" dur="indefinite" restart="never" nodeType="tmRoot"/>
+      </p:par>
+    </p:tnLst>
+  </p:timing>
 </p:sld>
 </file>
 
@@ -4333,13 +4527,7 @@
       </p:sp>
       <p:sp>
         <p:nvSpPr>
-          <p:cNvPr id="4" name="Espace réservé du numéro de diapositive 3">
-            <a:extLst>
-              <a:ext uri="{FF2B5EF4-FFF2-40B4-BE49-F238E27FC236}">
-                <a16:creationId xmlns:a16="http://schemas.microsoft.com/office/drawing/2014/main" id="{21FE3304-3D42-98B0-8B05-4B532C0D1749}"/>
-              </a:ext>
-            </a:extLst>
-          </p:cNvPr>
+          <p:cNvPr id="3" name="Espace réservé du numéro de diapositive 2"/>
           <p:cNvSpPr>
             <a:spLocks noGrp="1"/>
           </p:cNvSpPr>
@@ -4371,6 +4559,13 @@
   <p:clrMapOvr>
     <a:masterClrMapping/>
   </p:clrMapOvr>
+  <p:timing>
+    <p:tnLst>
+      <p:par>
+        <p:cTn id="1" dur="indefinite" restart="never" nodeType="tmRoot"/>
+      </p:par>
+    </p:tnLst>
+  </p:timing>
 </p:sld>
 </file>
 
@@ -4524,13 +4719,7 @@
       </p:sp>
       <p:sp>
         <p:nvSpPr>
-          <p:cNvPr id="4" name="Espace réservé du numéro de diapositive 3">
-            <a:extLst>
-              <a:ext uri="{FF2B5EF4-FFF2-40B4-BE49-F238E27FC236}">
-                <a16:creationId xmlns:a16="http://schemas.microsoft.com/office/drawing/2014/main" id="{122606E7-BA5A-B221-397D-BB97DC30A818}"/>
-              </a:ext>
-            </a:extLst>
-          </p:cNvPr>
+          <p:cNvPr id="2" name="Espace réservé du numéro de diapositive 1"/>
           <p:cNvSpPr>
             <a:spLocks noGrp="1"/>
           </p:cNvSpPr>
@@ -4561,6 +4750,13 @@
   <p:clrMapOvr>
     <a:masterClrMapping/>
   </p:clrMapOvr>
+  <p:timing>
+    <p:tnLst>
+      <p:par>
+        <p:cTn id="1" dur="indefinite" restart="never" nodeType="tmRoot"/>
+      </p:par>
+    </p:tnLst>
+  </p:timing>
 </p:sld>
 </file>
 
@@ -4586,6 +4782,186 @@
           <p:cNvPr id="2" name="Titre 1">
             <a:extLst>
               <a:ext uri="{FF2B5EF4-FFF2-40B4-BE49-F238E27FC236}">
+                <a16:creationId xmlns:a16="http://schemas.microsoft.com/office/drawing/2014/main" id="{3CCA4AA0-934F-8067-59A5-481C54A91E60}"/>
+              </a:ext>
+            </a:extLst>
+          </p:cNvPr>
+          <p:cNvSpPr>
+            <a:spLocks noGrp="1"/>
+          </p:cNvSpPr>
+          <p:nvPr>
+            <p:ph type="title"/>
+          </p:nvPr>
+        </p:nvSpPr>
+        <p:spPr/>
+        <p:txBody>
+          <a:bodyPr/>
+          <a:lstStyle/>
+          <a:p>
+            <a:r>
+              <a:rPr lang="fr-FR" dirty="0" smtClean="0"/>
+              <a:t>Remerciements</a:t>
+            </a:r>
+            <a:endParaRPr lang="fr-FR" dirty="0"/>
+          </a:p>
+        </p:txBody>
+      </p:sp>
+      <p:sp>
+        <p:nvSpPr>
+          <p:cNvPr id="3" name="Espace réservé du numéro de diapositive 2"/>
+          <p:cNvSpPr>
+            <a:spLocks noGrp="1"/>
+          </p:cNvSpPr>
+          <p:nvPr>
+            <p:ph type="sldNum" sz="quarter" idx="12"/>
+          </p:nvPr>
+        </p:nvSpPr>
+        <p:spPr/>
+        <p:txBody>
+          <a:bodyPr/>
+          <a:lstStyle/>
+          <a:p>
+            <a:fld id="{69E57DC2-970A-4B3E-BB1C-7A09969E49DF}" type="slidenum">
+              <a:rPr lang="en-US" smtClean="0"/>
+              <a:pPr/>
+              <a:t>4</a:t>
+            </a:fld>
+            <a:endParaRPr lang="en-US" dirty="0"/>
+          </a:p>
+        </p:txBody>
+      </p:sp>
+    </p:spTree>
+    <p:extLst>
+      <p:ext uri="{BB962C8B-B14F-4D97-AF65-F5344CB8AC3E}">
+        <p14:creationId xmlns:p14="http://schemas.microsoft.com/office/powerpoint/2010/main" val="813368215"/>
+      </p:ext>
+    </p:extLst>
+  </p:cSld>
+  <p:clrMapOvr>
+    <a:masterClrMapping/>
+  </p:clrMapOvr>
+  <p:timing>
+    <p:tnLst>
+      <p:par>
+        <p:cTn id="1" dur="indefinite" restart="never" nodeType="tmRoot"/>
+      </p:par>
+    </p:tnLst>
+  </p:timing>
+</p:sld>
+</file>
+
+<file path=ppt/slides/slide5.xml><?xml version="1.0" encoding="utf-8"?>
+<p:sld xmlns:a="http://schemas.openxmlformats.org/drawingml/2006/main" xmlns:r="http://schemas.openxmlformats.org/officeDocument/2006/relationships" xmlns:p="http://schemas.openxmlformats.org/presentationml/2006/main">
+  <p:cSld>
+    <p:spTree>
+      <p:nvGrpSpPr>
+        <p:cNvPr id="1" name=""/>
+        <p:cNvGrpSpPr/>
+        <p:nvPr/>
+      </p:nvGrpSpPr>
+      <p:grpSpPr>
+        <a:xfrm>
+          <a:off x="0" y="0"/>
+          <a:ext cx="0" cy="0"/>
+          <a:chOff x="0" y="0"/>
+          <a:chExt cx="0" cy="0"/>
+        </a:xfrm>
+      </p:grpSpPr>
+      <p:sp>
+        <p:nvSpPr>
+          <p:cNvPr id="2" name="Titre 1">
+            <a:extLst>
+              <a:ext uri="{FF2B5EF4-FFF2-40B4-BE49-F238E27FC236}">
+                <a16:creationId xmlns:a16="http://schemas.microsoft.com/office/drawing/2014/main" id="{3CCA4AA0-934F-8067-59A5-481C54A91E60}"/>
+              </a:ext>
+            </a:extLst>
+          </p:cNvPr>
+          <p:cNvSpPr>
+            <a:spLocks noGrp="1"/>
+          </p:cNvSpPr>
+          <p:nvPr>
+            <p:ph type="title"/>
+          </p:nvPr>
+        </p:nvSpPr>
+        <p:spPr/>
+        <p:txBody>
+          <a:bodyPr/>
+          <a:lstStyle/>
+          <a:p>
+            <a:r>
+              <a:rPr lang="fr-FR" dirty="0" smtClean="0"/>
+              <a:t>L’entreprise</a:t>
+            </a:r>
+            <a:endParaRPr lang="fr-FR" dirty="0"/>
+          </a:p>
+        </p:txBody>
+      </p:sp>
+      <p:sp>
+        <p:nvSpPr>
+          <p:cNvPr id="3" name="Espace réservé du numéro de diapositive 2"/>
+          <p:cNvSpPr>
+            <a:spLocks noGrp="1"/>
+          </p:cNvSpPr>
+          <p:nvPr>
+            <p:ph type="sldNum" sz="quarter" idx="12"/>
+          </p:nvPr>
+        </p:nvSpPr>
+        <p:spPr/>
+        <p:txBody>
+          <a:bodyPr/>
+          <a:lstStyle/>
+          <a:p>
+            <a:fld id="{69E57DC2-970A-4B3E-BB1C-7A09969E49DF}" type="slidenum">
+              <a:rPr lang="en-US" smtClean="0"/>
+              <a:pPr/>
+              <a:t>5</a:t>
+            </a:fld>
+            <a:endParaRPr lang="en-US" dirty="0"/>
+          </a:p>
+        </p:txBody>
+      </p:sp>
+    </p:spTree>
+    <p:extLst>
+      <p:ext uri="{BB962C8B-B14F-4D97-AF65-F5344CB8AC3E}">
+        <p14:creationId xmlns:p14="http://schemas.microsoft.com/office/powerpoint/2010/main" val="623883898"/>
+      </p:ext>
+    </p:extLst>
+  </p:cSld>
+  <p:clrMapOvr>
+    <a:masterClrMapping/>
+  </p:clrMapOvr>
+  <p:timing>
+    <p:tnLst>
+      <p:par>
+        <p:cTn id="1" dur="indefinite" restart="never" nodeType="tmRoot"/>
+      </p:par>
+    </p:tnLst>
+  </p:timing>
+</p:sld>
+</file>
+
+<file path=ppt/slides/slide6.xml><?xml version="1.0" encoding="utf-8"?>
+<p:sld xmlns:a="http://schemas.openxmlformats.org/drawingml/2006/main" xmlns:r="http://schemas.openxmlformats.org/officeDocument/2006/relationships" xmlns:p="http://schemas.openxmlformats.org/presentationml/2006/main">
+  <p:cSld>
+    <p:spTree>
+      <p:nvGrpSpPr>
+        <p:cNvPr id="1" name=""/>
+        <p:cNvGrpSpPr/>
+        <p:nvPr/>
+      </p:nvGrpSpPr>
+      <p:grpSpPr>
+        <a:xfrm>
+          <a:off x="0" y="0"/>
+          <a:ext cx="0" cy="0"/>
+          <a:chOff x="0" y="0"/>
+          <a:chExt cx="0" cy="0"/>
+        </a:xfrm>
+      </p:grpSpPr>
+      <p:sp>
+        <p:nvSpPr>
+          <p:cNvPr id="2" name="Titre 1">
+            <a:extLst>
+              <a:ext uri="{FF2B5EF4-FFF2-40B4-BE49-F238E27FC236}">
                 <a16:creationId xmlns:a16="http://schemas.microsoft.com/office/drawing/2014/main" id="{AE6FCE30-C681-8E0B-49EC-642B5A9FB5CD}"/>
               </a:ext>
             </a:extLst>
@@ -4597,12 +4973,21 @@
             <p:ph type="title"/>
           </p:nvPr>
         </p:nvSpPr>
-        <p:spPr/>
+        <p:spPr>
+          <a:xfrm>
+            <a:off x="4912820" y="355002"/>
+            <a:ext cx="7148946" cy="794478"/>
+          </a:xfrm>
+        </p:spPr>
         <p:txBody>
           <a:bodyPr/>
           <a:lstStyle/>
           <a:p>
-            <a:endParaRPr lang="fr-FR"/>
+            <a:r>
+              <a:rPr lang="fr-FR" dirty="0" smtClean="0"/>
+              <a:t>Présentation de l’entreprise</a:t>
+            </a:r>
+            <a:endParaRPr lang="fr-FR" dirty="0"/>
           </a:p>
         </p:txBody>
       </p:sp>
@@ -4627,39 +5012,80 @@
           <a:bodyPr/>
           <a:lstStyle/>
           <a:p>
-            <a:endParaRPr lang="fr-FR"/>
-          </a:p>
-        </p:txBody>
-      </p:sp>
-      <p:sp>
-        <p:nvSpPr>
-          <p:cNvPr id="4" name="Espace réservé du numéro de diapositive 3">
+            <a:r>
+              <a:rPr lang="fr-FR" dirty="0" smtClean="0"/>
+              <a:t>Fondé en 1992</a:t>
+            </a:r>
+          </a:p>
+          <a:p>
+            <a:r>
+              <a:rPr lang="fr-FR" dirty="0" smtClean="0"/>
+              <a:t>UMR du CNRS</a:t>
+            </a:r>
+            <a:endParaRPr lang="fr-FR" dirty="0" smtClean="0"/>
+          </a:p>
+          <a:p>
+            <a:r>
+              <a:rPr lang="fr-FR" dirty="0" smtClean="0"/>
+              <a:t>Fait parti du réseau RENATECH et RENATECH+ depuis 2003</a:t>
+            </a:r>
+            <a:endParaRPr lang="fr-FR" dirty="0"/>
+          </a:p>
+        </p:txBody>
+      </p:sp>
+      <p:sp>
+        <p:nvSpPr>
+          <p:cNvPr id="5" name="Espace réservé du numéro de diapositive 4"/>
+          <p:cNvSpPr>
+            <a:spLocks noGrp="1"/>
+          </p:cNvSpPr>
+          <p:nvPr>
+            <p:ph type="sldNum" sz="quarter" idx="12"/>
+          </p:nvPr>
+        </p:nvSpPr>
+        <p:spPr/>
+        <p:txBody>
+          <a:bodyPr/>
+          <a:lstStyle/>
+          <a:p>
+            <a:fld id="{69E57DC2-970A-4B3E-BB1C-7A09969E49DF}" type="slidenum">
+              <a:rPr lang="en-US" smtClean="0"/>
+              <a:t>6</a:t>
+            </a:fld>
+            <a:endParaRPr lang="en-US" dirty="0"/>
+          </a:p>
+        </p:txBody>
+      </p:sp>
+      <p:pic>
+        <p:nvPicPr>
+          <p:cNvPr id="6" name="Image 5">
             <a:extLst>
               <a:ext uri="{FF2B5EF4-FFF2-40B4-BE49-F238E27FC236}">
-                <a16:creationId xmlns:a16="http://schemas.microsoft.com/office/drawing/2014/main" id="{5250FEA3-D2F5-DBDD-447A-1ACAE1183999}"/>
+                <a16:creationId xmlns:a16="http://schemas.microsoft.com/office/drawing/2014/main" id="{777018A8-6C53-B0EF-D113-78AEFF6630A8}"/>
               </a:ext>
             </a:extLst>
           </p:cNvPr>
-          <p:cNvSpPr>
-            <a:spLocks noGrp="1"/>
-          </p:cNvSpPr>
-          <p:nvPr>
-            <p:ph type="sldNum" sz="quarter" idx="12"/>
-          </p:nvPr>
-        </p:nvSpPr>
-        <p:spPr/>
-        <p:txBody>
-          <a:bodyPr/>
-          <a:lstStyle/>
-          <a:p>
-            <a:fld id="{69E57DC2-970A-4B3E-BB1C-7A09969E49DF}" type="slidenum">
-              <a:rPr lang="en-US" smtClean="0"/>
-              <a:t>4</a:t>
-            </a:fld>
-            <a:endParaRPr lang="en-US" dirty="0"/>
-          </a:p>
-        </p:txBody>
-      </p:sp>
+          <p:cNvPicPr>
+            <a:picLocks noChangeAspect="1"/>
+          </p:cNvPicPr>
+          <p:nvPr/>
+        </p:nvPicPr>
+        <p:blipFill>
+          <a:blip r:embed="rId2"/>
+          <a:stretch>
+            <a:fillRect/>
+          </a:stretch>
+        </p:blipFill>
+        <p:spPr>
+          <a:xfrm>
+            <a:off x="887360" y="355002"/>
+            <a:ext cx="3882768" cy="1345012"/>
+          </a:xfrm>
+          <a:prstGeom prst="rect">
+            <a:avLst/>
+          </a:prstGeom>
+        </p:spPr>
+      </p:pic>
     </p:spTree>
     <p:extLst>
       <p:ext uri="{BB962C8B-B14F-4D97-AF65-F5344CB8AC3E}">
@@ -4670,6 +5096,1061 @@
   <p:clrMapOvr>
     <a:masterClrMapping/>
   </p:clrMapOvr>
+  <p:timing>
+    <p:tnLst>
+      <p:par>
+        <p:cTn id="1" dur="indefinite" restart="never" nodeType="tmRoot"/>
+      </p:par>
+    </p:tnLst>
+  </p:timing>
+</p:sld>
+</file>
+
+<file path=ppt/slides/slide7.xml><?xml version="1.0" encoding="utf-8"?>
+<p:sld xmlns:a="http://schemas.openxmlformats.org/drawingml/2006/main" xmlns:r="http://schemas.openxmlformats.org/officeDocument/2006/relationships" xmlns:p="http://schemas.openxmlformats.org/presentationml/2006/main">
+  <p:cSld>
+    <p:spTree>
+      <p:nvGrpSpPr>
+        <p:cNvPr id="1" name=""/>
+        <p:cNvGrpSpPr/>
+        <p:nvPr/>
+      </p:nvGrpSpPr>
+      <p:grpSpPr>
+        <a:xfrm>
+          <a:off x="0" y="0"/>
+          <a:ext cx="0" cy="0"/>
+          <a:chOff x="0" y="0"/>
+          <a:chExt cx="0" cy="0"/>
+        </a:xfrm>
+      </p:grpSpPr>
+      <p:sp>
+        <p:nvSpPr>
+          <p:cNvPr id="2" name="Titre 1"/>
+          <p:cNvSpPr>
+            <a:spLocks noGrp="1"/>
+          </p:cNvSpPr>
+          <p:nvPr>
+            <p:ph type="title"/>
+          </p:nvPr>
+        </p:nvSpPr>
+        <p:spPr>
+          <a:xfrm>
+            <a:off x="1180407" y="228600"/>
+            <a:ext cx="6093229" cy="702425"/>
+          </a:xfrm>
+        </p:spPr>
+        <p:txBody>
+          <a:bodyPr/>
+          <a:lstStyle/>
+          <a:p>
+            <a:r>
+              <a:rPr lang="fr-FR" dirty="0" smtClean="0"/>
+              <a:t>Présentation de l’équipe</a:t>
+            </a:r>
+            <a:endParaRPr lang="fr-FR" dirty="0"/>
+          </a:p>
+        </p:txBody>
+      </p:sp>
+      <p:sp>
+        <p:nvSpPr>
+          <p:cNvPr id="4" name="Espace réservé du numéro de diapositive 3"/>
+          <p:cNvSpPr>
+            <a:spLocks noGrp="1"/>
+          </p:cNvSpPr>
+          <p:nvPr>
+            <p:ph type="sldNum" sz="quarter" idx="12"/>
+          </p:nvPr>
+        </p:nvSpPr>
+        <p:spPr/>
+        <p:txBody>
+          <a:bodyPr/>
+          <a:lstStyle/>
+          <a:p>
+            <a:fld id="{69E57DC2-970A-4B3E-BB1C-7A09969E49DF}" type="slidenum">
+              <a:rPr lang="en-US" smtClean="0"/>
+              <a:t>7</a:t>
+            </a:fld>
+            <a:endParaRPr lang="en-US" dirty="0"/>
+          </a:p>
+        </p:txBody>
+      </p:sp>
+      <p:pic>
+        <p:nvPicPr>
+          <p:cNvPr id="5" name="Image 4" descr="Une image contenant texte, clipart&#10;&#10;Description générée automatiquement"/>
+          <p:cNvPicPr/>
+          <p:nvPr/>
+        </p:nvPicPr>
+        <p:blipFill>
+          <a:blip r:embed="rId2">
+            <a:extLst>
+              <a:ext uri="{28A0092B-C50C-407E-A947-70E740481C1C}">
+                <a14:useLocalDpi xmlns:a14="http://schemas.microsoft.com/office/drawing/2010/main" val="0"/>
+              </a:ext>
+            </a:extLst>
+          </a:blip>
+          <a:stretch>
+            <a:fillRect/>
+          </a:stretch>
+        </p:blipFill>
+        <p:spPr>
+          <a:xfrm>
+            <a:off x="5762625" y="1133850"/>
+            <a:ext cx="819150" cy="819150"/>
+          </a:xfrm>
+          <a:prstGeom prst="rect">
+            <a:avLst/>
+          </a:prstGeom>
+        </p:spPr>
+      </p:pic>
+      <p:pic>
+        <p:nvPicPr>
+          <p:cNvPr id="6" name="Image 5" descr="Une image contenant texte, clipart&#10;&#10;Description générée automatiquement"/>
+          <p:cNvPicPr/>
+          <p:nvPr/>
+        </p:nvPicPr>
+        <p:blipFill>
+          <a:blip r:embed="rId2">
+            <a:extLst>
+              <a:ext uri="{28A0092B-C50C-407E-A947-70E740481C1C}">
+                <a14:useLocalDpi xmlns:a14="http://schemas.microsoft.com/office/drawing/2010/main" val="0"/>
+              </a:ext>
+            </a:extLst>
+          </a:blip>
+          <a:stretch>
+            <a:fillRect/>
+          </a:stretch>
+        </p:blipFill>
+        <p:spPr>
+          <a:xfrm>
+            <a:off x="5762625" y="3019425"/>
+            <a:ext cx="819150" cy="819150"/>
+          </a:xfrm>
+          <a:prstGeom prst="rect">
+            <a:avLst/>
+          </a:prstGeom>
+        </p:spPr>
+      </p:pic>
+      <p:pic>
+        <p:nvPicPr>
+          <p:cNvPr id="7" name="Image 6" descr="Une image contenant texte, clipart&#10;&#10;Description générée automatiquement"/>
+          <p:cNvPicPr/>
+          <p:nvPr/>
+        </p:nvPicPr>
+        <p:blipFill>
+          <a:blip r:embed="rId2">
+            <a:extLst>
+              <a:ext uri="{28A0092B-C50C-407E-A947-70E740481C1C}">
+                <a14:useLocalDpi xmlns:a14="http://schemas.microsoft.com/office/drawing/2010/main" val="0"/>
+              </a:ext>
+            </a:extLst>
+          </a:blip>
+          <a:stretch>
+            <a:fillRect/>
+          </a:stretch>
+        </p:blipFill>
+        <p:spPr>
+          <a:xfrm>
+            <a:off x="3236941" y="3019425"/>
+            <a:ext cx="819150" cy="819150"/>
+          </a:xfrm>
+          <a:prstGeom prst="rect">
+            <a:avLst/>
+          </a:prstGeom>
+        </p:spPr>
+      </p:pic>
+      <p:pic>
+        <p:nvPicPr>
+          <p:cNvPr id="8" name="Image 7" descr="Une image contenant texte, clipart&#10;&#10;Description générée automatiquement"/>
+          <p:cNvPicPr/>
+          <p:nvPr/>
+        </p:nvPicPr>
+        <p:blipFill>
+          <a:blip r:embed="rId2">
+            <a:extLst>
+              <a:ext uri="{28A0092B-C50C-407E-A947-70E740481C1C}">
+                <a14:useLocalDpi xmlns:a14="http://schemas.microsoft.com/office/drawing/2010/main" val="0"/>
+              </a:ext>
+            </a:extLst>
+          </a:blip>
+          <a:stretch>
+            <a:fillRect/>
+          </a:stretch>
+        </p:blipFill>
+        <p:spPr>
+          <a:xfrm>
+            <a:off x="8288309" y="3019425"/>
+            <a:ext cx="819150" cy="819150"/>
+          </a:xfrm>
+          <a:prstGeom prst="rect">
+            <a:avLst/>
+          </a:prstGeom>
+        </p:spPr>
+      </p:pic>
+      <p:pic>
+        <p:nvPicPr>
+          <p:cNvPr id="9" name="Image 8" descr="Une image contenant texte&#10;&#10;Description générée automatiquement"/>
+          <p:cNvPicPr/>
+          <p:nvPr/>
+        </p:nvPicPr>
+        <p:blipFill>
+          <a:blip r:embed="rId3">
+            <a:extLst>
+              <a:ext uri="{28A0092B-C50C-407E-A947-70E740481C1C}">
+                <a14:useLocalDpi xmlns:a14="http://schemas.microsoft.com/office/drawing/2010/main" val="0"/>
+              </a:ext>
+            </a:extLst>
+          </a:blip>
+          <a:stretch>
+            <a:fillRect/>
+          </a:stretch>
+        </p:blipFill>
+        <p:spPr>
+          <a:xfrm>
+            <a:off x="4647287" y="4686298"/>
+            <a:ext cx="809625" cy="809625"/>
+          </a:xfrm>
+          <a:prstGeom prst="rect">
+            <a:avLst/>
+          </a:prstGeom>
+        </p:spPr>
+      </p:pic>
+      <p:pic>
+        <p:nvPicPr>
+          <p:cNvPr id="10" name="Image 9" descr="Une image contenant texte&#10;&#10;Description générée automatiquement"/>
+          <p:cNvPicPr/>
+          <p:nvPr/>
+        </p:nvPicPr>
+        <p:blipFill>
+          <a:blip r:embed="rId3">
+            <a:extLst>
+              <a:ext uri="{28A0092B-C50C-407E-A947-70E740481C1C}">
+                <a14:useLocalDpi xmlns:a14="http://schemas.microsoft.com/office/drawing/2010/main" val="0"/>
+              </a:ext>
+            </a:extLst>
+          </a:blip>
+          <a:stretch>
+            <a:fillRect/>
+          </a:stretch>
+        </p:blipFill>
+        <p:spPr>
+          <a:xfrm>
+            <a:off x="2315697" y="4686298"/>
+            <a:ext cx="809625" cy="809625"/>
+          </a:xfrm>
+          <a:prstGeom prst="rect">
+            <a:avLst/>
+          </a:prstGeom>
+        </p:spPr>
+      </p:pic>
+      <p:pic>
+        <p:nvPicPr>
+          <p:cNvPr id="11" name="Image 10" descr="Une image contenant texte&#10;&#10;Description générée automatiquement"/>
+          <p:cNvPicPr/>
+          <p:nvPr/>
+        </p:nvPicPr>
+        <p:blipFill>
+          <a:blip r:embed="rId3">
+            <a:extLst>
+              <a:ext uri="{28A0092B-C50C-407E-A947-70E740481C1C}">
+                <a14:useLocalDpi xmlns:a14="http://schemas.microsoft.com/office/drawing/2010/main" val="0"/>
+              </a:ext>
+            </a:extLst>
+          </a:blip>
+          <a:stretch>
+            <a:fillRect/>
+          </a:stretch>
+        </p:blipFill>
+        <p:spPr>
+          <a:xfrm>
+            <a:off x="6978877" y="4686298"/>
+            <a:ext cx="809625" cy="809625"/>
+          </a:xfrm>
+          <a:prstGeom prst="rect">
+            <a:avLst/>
+          </a:prstGeom>
+        </p:spPr>
+      </p:pic>
+      <p:pic>
+        <p:nvPicPr>
+          <p:cNvPr id="12" name="Image 11" descr="Une image contenant texte&#10;&#10;Description générée automatiquement"/>
+          <p:cNvPicPr/>
+          <p:nvPr/>
+        </p:nvPicPr>
+        <p:blipFill>
+          <a:blip r:embed="rId4">
+            <a:extLst>
+              <a:ext uri="{28A0092B-C50C-407E-A947-70E740481C1C}">
+                <a14:useLocalDpi xmlns:a14="http://schemas.microsoft.com/office/drawing/2010/main" val="0"/>
+              </a:ext>
+            </a:extLst>
+          </a:blip>
+          <a:stretch>
+            <a:fillRect/>
+          </a:stretch>
+        </p:blipFill>
+        <p:spPr>
+          <a:xfrm>
+            <a:off x="9310467" y="4691060"/>
+            <a:ext cx="800100" cy="800100"/>
+          </a:xfrm>
+          <a:prstGeom prst="rect">
+            <a:avLst/>
+          </a:prstGeom>
+        </p:spPr>
+      </p:pic>
+      <p:sp>
+        <p:nvSpPr>
+          <p:cNvPr id="13" name="Zone de texte 2"/>
+          <p:cNvSpPr txBox="1">
+            <a:spLocks noChangeArrowheads="1"/>
+          </p:cNvSpPr>
+          <p:nvPr/>
+        </p:nvSpPr>
+        <p:spPr bwMode="auto">
+          <a:xfrm>
+            <a:off x="5456912" y="2078411"/>
+            <a:ext cx="1524000" cy="730250"/>
+          </a:xfrm>
+          <a:prstGeom prst="rect">
+            <a:avLst/>
+          </a:prstGeom>
+          <a:noFill/>
+          <a:ln w="9525">
+            <a:noFill/>
+            <a:miter lim="800000"/>
+            <a:headEnd/>
+            <a:tailEnd/>
+          </a:ln>
+        </p:spPr>
+        <p:txBody>
+          <a:bodyPr rot="0" vert="horz" wrap="square" lIns="91440" tIns="45720" rIns="91440" bIns="45720" anchor="t" anchorCtr="0">
+            <a:spAutoFit/>
+          </a:bodyPr>
+          <a:lstStyle/>
+          <a:p>
+            <a:pPr algn="ctr">
+              <a:lnSpc>
+                <a:spcPct val="110000"/>
+              </a:lnSpc>
+              <a:spcAft>
+                <a:spcPts val="600"/>
+              </a:spcAft>
+            </a:pPr>
+            <a:r>
+              <a:rPr lang="fr-FR" sz="1400" b="1" dirty="0">
+                <a:effectLst/>
+                <a:latin typeface="Calibri" panose="020F0502020204030204" pitchFamily="34" charset="0"/>
+                <a:ea typeface="Yu Mincho"/>
+                <a:cs typeface="Times New Roman" panose="02020603050405020304" pitchFamily="18" charset="0"/>
+              </a:rPr>
+              <a:t>Benjamin LECHA</a:t>
+            </a:r>
+            <a:endParaRPr lang="fr-FR" sz="1050" dirty="0">
+              <a:effectLst/>
+              <a:latin typeface="Calibri" panose="020F0502020204030204" pitchFamily="34" charset="0"/>
+              <a:ea typeface="Yu Mincho"/>
+              <a:cs typeface="Times New Roman" panose="02020603050405020304" pitchFamily="18" charset="0"/>
+            </a:endParaRPr>
+          </a:p>
+          <a:p>
+            <a:pPr algn="ctr">
+              <a:lnSpc>
+                <a:spcPct val="110000"/>
+              </a:lnSpc>
+              <a:spcAft>
+                <a:spcPts val="600"/>
+              </a:spcAft>
+            </a:pPr>
+            <a:r>
+              <a:rPr lang="fr-FR" sz="1400" i="1" dirty="0">
+                <a:effectLst/>
+                <a:latin typeface="Calibri" panose="020F0502020204030204" pitchFamily="34" charset="0"/>
+                <a:ea typeface="Yu Mincho"/>
+                <a:cs typeface="Times New Roman" panose="02020603050405020304" pitchFamily="18" charset="0"/>
+              </a:rPr>
+              <a:t>Chef de projet</a:t>
+            </a:r>
+            <a:endParaRPr lang="fr-FR" sz="1050" dirty="0">
+              <a:effectLst/>
+              <a:latin typeface="Calibri" panose="020F0502020204030204" pitchFamily="34" charset="0"/>
+              <a:ea typeface="Yu Mincho"/>
+              <a:cs typeface="Times New Roman" panose="02020603050405020304" pitchFamily="18" charset="0"/>
+            </a:endParaRPr>
+          </a:p>
+        </p:txBody>
+      </p:sp>
+      <p:sp>
+        <p:nvSpPr>
+          <p:cNvPr id="14" name="Zone de texte 2"/>
+          <p:cNvSpPr txBox="1">
+            <a:spLocks noChangeArrowheads="1"/>
+          </p:cNvSpPr>
+          <p:nvPr/>
+        </p:nvSpPr>
+        <p:spPr bwMode="auto">
+          <a:xfrm>
+            <a:off x="2808316" y="3956048"/>
+            <a:ext cx="1676400" cy="730250"/>
+          </a:xfrm>
+          <a:prstGeom prst="rect">
+            <a:avLst/>
+          </a:prstGeom>
+          <a:noFill/>
+          <a:ln w="9525">
+            <a:noFill/>
+            <a:miter lim="800000"/>
+            <a:headEnd/>
+            <a:tailEnd/>
+          </a:ln>
+        </p:spPr>
+        <p:txBody>
+          <a:bodyPr rot="0" vert="horz" wrap="square" lIns="91440" tIns="45720" rIns="91440" bIns="45720" anchor="t" anchorCtr="0">
+            <a:spAutoFit/>
+          </a:bodyPr>
+          <a:lstStyle/>
+          <a:p>
+            <a:pPr algn="ctr">
+              <a:lnSpc>
+                <a:spcPct val="110000"/>
+              </a:lnSpc>
+              <a:spcAft>
+                <a:spcPts val="600"/>
+              </a:spcAft>
+            </a:pPr>
+            <a:r>
+              <a:rPr lang="fr-FR" sz="1400" b="1">
+                <a:effectLst/>
+                <a:latin typeface="Calibri" panose="020F0502020204030204" pitchFamily="34" charset="0"/>
+                <a:ea typeface="Yu Mincho"/>
+                <a:cs typeface="Times New Roman" panose="02020603050405020304" pitchFamily="18" charset="0"/>
+              </a:rPr>
+              <a:t>Billel GUERBOUKHA</a:t>
+            </a:r>
+            <a:endParaRPr lang="fr-FR" sz="1050">
+              <a:effectLst/>
+              <a:latin typeface="Calibri" panose="020F0502020204030204" pitchFamily="34" charset="0"/>
+              <a:ea typeface="Yu Mincho"/>
+              <a:cs typeface="Times New Roman" panose="02020603050405020304" pitchFamily="18" charset="0"/>
+            </a:endParaRPr>
+          </a:p>
+          <a:p>
+            <a:pPr algn="ctr">
+              <a:lnSpc>
+                <a:spcPct val="110000"/>
+              </a:lnSpc>
+              <a:spcAft>
+                <a:spcPts val="600"/>
+              </a:spcAft>
+            </a:pPr>
+            <a:r>
+              <a:rPr lang="fr-FR" sz="1400" i="1">
+                <a:effectLst/>
+                <a:latin typeface="Calibri" panose="020F0502020204030204" pitchFamily="34" charset="0"/>
+                <a:ea typeface="Yu Mincho"/>
+                <a:cs typeface="Times New Roman" panose="02020603050405020304" pitchFamily="18" charset="0"/>
+              </a:rPr>
+              <a:t>Développeur</a:t>
+            </a:r>
+            <a:endParaRPr lang="fr-FR" sz="1050">
+              <a:effectLst/>
+              <a:latin typeface="Calibri" panose="020F0502020204030204" pitchFamily="34" charset="0"/>
+              <a:ea typeface="Yu Mincho"/>
+              <a:cs typeface="Times New Roman" panose="02020603050405020304" pitchFamily="18" charset="0"/>
+            </a:endParaRPr>
+          </a:p>
+        </p:txBody>
+      </p:sp>
+      <p:sp>
+        <p:nvSpPr>
+          <p:cNvPr id="15" name="Zone de texte 2"/>
+          <p:cNvSpPr txBox="1">
+            <a:spLocks noChangeArrowheads="1"/>
+          </p:cNvSpPr>
+          <p:nvPr/>
+        </p:nvSpPr>
+        <p:spPr bwMode="auto">
+          <a:xfrm>
+            <a:off x="5410200" y="3956047"/>
+            <a:ext cx="1524000" cy="730250"/>
+          </a:xfrm>
+          <a:prstGeom prst="rect">
+            <a:avLst/>
+          </a:prstGeom>
+          <a:noFill/>
+          <a:ln w="9525">
+            <a:noFill/>
+            <a:miter lim="800000"/>
+            <a:headEnd/>
+            <a:tailEnd/>
+          </a:ln>
+        </p:spPr>
+        <p:txBody>
+          <a:bodyPr rot="0" vert="horz" wrap="square" lIns="91440" tIns="45720" rIns="91440" bIns="45720" anchor="t" anchorCtr="0">
+            <a:spAutoFit/>
+          </a:bodyPr>
+          <a:lstStyle/>
+          <a:p>
+            <a:pPr algn="ctr">
+              <a:lnSpc>
+                <a:spcPct val="110000"/>
+              </a:lnSpc>
+              <a:spcAft>
+                <a:spcPts val="600"/>
+              </a:spcAft>
+            </a:pPr>
+            <a:r>
+              <a:rPr lang="fr-FR" sz="1400" b="1">
+                <a:effectLst/>
+                <a:latin typeface="Calibri" panose="020F0502020204030204" pitchFamily="34" charset="0"/>
+                <a:ea typeface="Yu Mincho"/>
+                <a:cs typeface="Times New Roman" panose="02020603050405020304" pitchFamily="18" charset="0"/>
+              </a:rPr>
+              <a:t>Dino El HANI</a:t>
+            </a:r>
+            <a:endParaRPr lang="fr-FR" sz="1050">
+              <a:effectLst/>
+              <a:latin typeface="Calibri" panose="020F0502020204030204" pitchFamily="34" charset="0"/>
+              <a:ea typeface="Yu Mincho"/>
+              <a:cs typeface="Times New Roman" panose="02020603050405020304" pitchFamily="18" charset="0"/>
+            </a:endParaRPr>
+          </a:p>
+          <a:p>
+            <a:pPr algn="ctr">
+              <a:lnSpc>
+                <a:spcPct val="110000"/>
+              </a:lnSpc>
+              <a:spcAft>
+                <a:spcPts val="600"/>
+              </a:spcAft>
+            </a:pPr>
+            <a:r>
+              <a:rPr lang="fr-FR" sz="1400" i="1">
+                <a:effectLst/>
+                <a:latin typeface="Calibri" panose="020F0502020204030204" pitchFamily="34" charset="0"/>
+                <a:ea typeface="Yu Mincho"/>
+                <a:cs typeface="Times New Roman" panose="02020603050405020304" pitchFamily="18" charset="0"/>
+              </a:rPr>
+              <a:t>Développeur</a:t>
+            </a:r>
+            <a:endParaRPr lang="fr-FR" sz="1050">
+              <a:effectLst/>
+              <a:latin typeface="Calibri" panose="020F0502020204030204" pitchFamily="34" charset="0"/>
+              <a:ea typeface="Yu Mincho"/>
+              <a:cs typeface="Times New Roman" panose="02020603050405020304" pitchFamily="18" charset="0"/>
+            </a:endParaRPr>
+          </a:p>
+        </p:txBody>
+      </p:sp>
+      <p:sp>
+        <p:nvSpPr>
+          <p:cNvPr id="16" name="Zone de texte 2"/>
+          <p:cNvSpPr txBox="1">
+            <a:spLocks noChangeArrowheads="1"/>
+          </p:cNvSpPr>
+          <p:nvPr/>
+        </p:nvSpPr>
+        <p:spPr bwMode="auto">
+          <a:xfrm>
+            <a:off x="7826346" y="3954563"/>
+            <a:ext cx="1743075" cy="730250"/>
+          </a:xfrm>
+          <a:prstGeom prst="rect">
+            <a:avLst/>
+          </a:prstGeom>
+          <a:noFill/>
+          <a:ln w="9525">
+            <a:noFill/>
+            <a:miter lim="800000"/>
+            <a:headEnd/>
+            <a:tailEnd/>
+          </a:ln>
+        </p:spPr>
+        <p:txBody>
+          <a:bodyPr rot="0" vert="horz" wrap="square" lIns="91440" tIns="45720" rIns="91440" bIns="45720" anchor="t" anchorCtr="0">
+            <a:spAutoFit/>
+          </a:bodyPr>
+          <a:lstStyle/>
+          <a:p>
+            <a:pPr algn="ctr">
+              <a:lnSpc>
+                <a:spcPct val="110000"/>
+              </a:lnSpc>
+              <a:spcAft>
+                <a:spcPts val="600"/>
+              </a:spcAft>
+            </a:pPr>
+            <a:r>
+              <a:rPr lang="fr-FR" sz="1400" b="1">
+                <a:effectLst/>
+                <a:latin typeface="Calibri" panose="020F0502020204030204" pitchFamily="34" charset="0"/>
+                <a:ea typeface="Yu Mincho"/>
+                <a:cs typeface="Times New Roman" panose="02020603050405020304" pitchFamily="18" charset="0"/>
+              </a:rPr>
+              <a:t>Nicolas GOGUILLON</a:t>
+            </a:r>
+            <a:endParaRPr lang="fr-FR" sz="1050">
+              <a:effectLst/>
+              <a:latin typeface="Calibri" panose="020F0502020204030204" pitchFamily="34" charset="0"/>
+              <a:ea typeface="Yu Mincho"/>
+              <a:cs typeface="Times New Roman" panose="02020603050405020304" pitchFamily="18" charset="0"/>
+            </a:endParaRPr>
+          </a:p>
+          <a:p>
+            <a:pPr algn="ctr">
+              <a:lnSpc>
+                <a:spcPct val="110000"/>
+              </a:lnSpc>
+              <a:spcAft>
+                <a:spcPts val="600"/>
+              </a:spcAft>
+            </a:pPr>
+            <a:r>
+              <a:rPr lang="fr-FR" sz="1400" i="1">
+                <a:effectLst/>
+                <a:latin typeface="Calibri" panose="020F0502020204030204" pitchFamily="34" charset="0"/>
+                <a:ea typeface="Yu Mincho"/>
+                <a:cs typeface="Times New Roman" panose="02020603050405020304" pitchFamily="18" charset="0"/>
+              </a:rPr>
+              <a:t>Développeur</a:t>
+            </a:r>
+            <a:endParaRPr lang="fr-FR" sz="1050">
+              <a:effectLst/>
+              <a:latin typeface="Calibri" panose="020F0502020204030204" pitchFamily="34" charset="0"/>
+              <a:ea typeface="Yu Mincho"/>
+              <a:cs typeface="Times New Roman" panose="02020603050405020304" pitchFamily="18" charset="0"/>
+            </a:endParaRPr>
+          </a:p>
+        </p:txBody>
+      </p:sp>
+      <p:sp>
+        <p:nvSpPr>
+          <p:cNvPr id="17" name="Zone de texte 2"/>
+          <p:cNvSpPr txBox="1">
+            <a:spLocks noChangeArrowheads="1"/>
+          </p:cNvSpPr>
+          <p:nvPr/>
+        </p:nvSpPr>
+        <p:spPr bwMode="auto">
+          <a:xfrm>
+            <a:off x="1958509" y="5719330"/>
+            <a:ext cx="1524000" cy="415290"/>
+          </a:xfrm>
+          <a:prstGeom prst="rect">
+            <a:avLst/>
+          </a:prstGeom>
+          <a:noFill/>
+          <a:ln w="9525">
+            <a:noFill/>
+            <a:miter lim="800000"/>
+            <a:headEnd/>
+            <a:tailEnd/>
+          </a:ln>
+        </p:spPr>
+        <p:txBody>
+          <a:bodyPr rot="0" vert="horz" wrap="square" lIns="91440" tIns="45720" rIns="91440" bIns="45720" anchor="t" anchorCtr="0">
+            <a:spAutoFit/>
+          </a:bodyPr>
+          <a:lstStyle/>
+          <a:p>
+            <a:pPr algn="ctr">
+              <a:lnSpc>
+                <a:spcPct val="110000"/>
+              </a:lnSpc>
+              <a:spcAft>
+                <a:spcPts val="600"/>
+              </a:spcAft>
+            </a:pPr>
+            <a:r>
+              <a:rPr lang="fr-FR" sz="1400" b="1">
+                <a:effectLst/>
+                <a:latin typeface="Calibri" panose="020F0502020204030204" pitchFamily="34" charset="0"/>
+                <a:ea typeface="Yu Mincho"/>
+                <a:cs typeface="Times New Roman" panose="02020603050405020304" pitchFamily="18" charset="0"/>
+              </a:rPr>
+              <a:t>Yoan DECONINCK</a:t>
+            </a:r>
+            <a:endParaRPr lang="fr-FR" sz="1050">
+              <a:effectLst/>
+              <a:latin typeface="Calibri" panose="020F0502020204030204" pitchFamily="34" charset="0"/>
+              <a:ea typeface="Yu Mincho"/>
+              <a:cs typeface="Times New Roman" panose="02020603050405020304" pitchFamily="18" charset="0"/>
+            </a:endParaRPr>
+          </a:p>
+        </p:txBody>
+      </p:sp>
+      <p:sp>
+        <p:nvSpPr>
+          <p:cNvPr id="18" name="Zone de texte 2"/>
+          <p:cNvSpPr txBox="1">
+            <a:spLocks noChangeArrowheads="1"/>
+          </p:cNvSpPr>
+          <p:nvPr/>
+        </p:nvSpPr>
+        <p:spPr bwMode="auto">
+          <a:xfrm>
+            <a:off x="4290099" y="5719330"/>
+            <a:ext cx="1524000" cy="415290"/>
+          </a:xfrm>
+          <a:prstGeom prst="rect">
+            <a:avLst/>
+          </a:prstGeom>
+          <a:noFill/>
+          <a:ln w="9525">
+            <a:noFill/>
+            <a:miter lim="800000"/>
+            <a:headEnd/>
+            <a:tailEnd/>
+          </a:ln>
+        </p:spPr>
+        <p:txBody>
+          <a:bodyPr rot="0" vert="horz" wrap="square" lIns="91440" tIns="45720" rIns="91440" bIns="45720" anchor="t" anchorCtr="0">
+            <a:spAutoFit/>
+          </a:bodyPr>
+          <a:lstStyle/>
+          <a:p>
+            <a:pPr algn="ctr">
+              <a:lnSpc>
+                <a:spcPct val="110000"/>
+              </a:lnSpc>
+              <a:spcAft>
+                <a:spcPts val="600"/>
+              </a:spcAft>
+            </a:pPr>
+            <a:r>
+              <a:rPr lang="fr-FR" sz="1400" b="1">
+                <a:effectLst/>
+                <a:latin typeface="Calibri" panose="020F0502020204030204" pitchFamily="34" charset="0"/>
+                <a:ea typeface="Yu Mincho"/>
+                <a:cs typeface="Times New Roman" panose="02020603050405020304" pitchFamily="18" charset="0"/>
+              </a:rPr>
+              <a:t>Antoine LEVA</a:t>
+            </a:r>
+            <a:endParaRPr lang="fr-FR" sz="1050">
+              <a:effectLst/>
+              <a:latin typeface="Calibri" panose="020F0502020204030204" pitchFamily="34" charset="0"/>
+              <a:ea typeface="Yu Mincho"/>
+              <a:cs typeface="Times New Roman" panose="02020603050405020304" pitchFamily="18" charset="0"/>
+            </a:endParaRPr>
+          </a:p>
+        </p:txBody>
+      </p:sp>
+      <p:sp>
+        <p:nvSpPr>
+          <p:cNvPr id="19" name="Zone de texte 2"/>
+          <p:cNvSpPr txBox="1">
+            <a:spLocks noChangeArrowheads="1"/>
+          </p:cNvSpPr>
+          <p:nvPr/>
+        </p:nvSpPr>
+        <p:spPr bwMode="auto">
+          <a:xfrm>
+            <a:off x="6621689" y="5734191"/>
+            <a:ext cx="1524000" cy="415290"/>
+          </a:xfrm>
+          <a:prstGeom prst="rect">
+            <a:avLst/>
+          </a:prstGeom>
+          <a:noFill/>
+          <a:ln w="9525">
+            <a:noFill/>
+            <a:miter lim="800000"/>
+            <a:headEnd/>
+            <a:tailEnd/>
+          </a:ln>
+        </p:spPr>
+        <p:txBody>
+          <a:bodyPr rot="0" vert="horz" wrap="square" lIns="91440" tIns="45720" rIns="91440" bIns="45720" anchor="t" anchorCtr="0">
+            <a:spAutoFit/>
+          </a:bodyPr>
+          <a:lstStyle/>
+          <a:p>
+            <a:pPr algn="ctr">
+              <a:lnSpc>
+                <a:spcPct val="110000"/>
+              </a:lnSpc>
+              <a:spcAft>
+                <a:spcPts val="600"/>
+              </a:spcAft>
+            </a:pPr>
+            <a:r>
+              <a:rPr lang="fr-FR" sz="1400" b="1">
+                <a:effectLst/>
+                <a:latin typeface="Calibri" panose="020F0502020204030204" pitchFamily="34" charset="0"/>
+                <a:ea typeface="Yu Mincho"/>
+                <a:cs typeface="Times New Roman" panose="02020603050405020304" pitchFamily="18" charset="0"/>
+              </a:rPr>
+              <a:t>Julien PRONIER</a:t>
+            </a:r>
+            <a:endParaRPr lang="fr-FR" sz="1050">
+              <a:effectLst/>
+              <a:latin typeface="Calibri" panose="020F0502020204030204" pitchFamily="34" charset="0"/>
+              <a:ea typeface="Yu Mincho"/>
+              <a:cs typeface="Times New Roman" panose="02020603050405020304" pitchFamily="18" charset="0"/>
+            </a:endParaRPr>
+          </a:p>
+        </p:txBody>
+      </p:sp>
+      <p:sp>
+        <p:nvSpPr>
+          <p:cNvPr id="20" name="Zone de texte 2"/>
+          <p:cNvSpPr txBox="1">
+            <a:spLocks noChangeArrowheads="1"/>
+          </p:cNvSpPr>
+          <p:nvPr/>
+        </p:nvSpPr>
+        <p:spPr bwMode="auto">
+          <a:xfrm>
+            <a:off x="8948517" y="5717705"/>
+            <a:ext cx="1524000" cy="415290"/>
+          </a:xfrm>
+          <a:prstGeom prst="rect">
+            <a:avLst/>
+          </a:prstGeom>
+          <a:noFill/>
+          <a:ln w="9525">
+            <a:noFill/>
+            <a:miter lim="800000"/>
+            <a:headEnd/>
+            <a:tailEnd/>
+          </a:ln>
+        </p:spPr>
+        <p:txBody>
+          <a:bodyPr rot="0" vert="horz" wrap="square" lIns="91440" tIns="45720" rIns="91440" bIns="45720" anchor="t" anchorCtr="0">
+            <a:spAutoFit/>
+          </a:bodyPr>
+          <a:lstStyle/>
+          <a:p>
+            <a:pPr algn="ctr">
+              <a:lnSpc>
+                <a:spcPct val="110000"/>
+              </a:lnSpc>
+              <a:spcAft>
+                <a:spcPts val="600"/>
+              </a:spcAft>
+            </a:pPr>
+            <a:r>
+              <a:rPr lang="fr-FR" sz="1400" b="1">
+                <a:effectLst/>
+                <a:latin typeface="Calibri" panose="020F0502020204030204" pitchFamily="34" charset="0"/>
+                <a:ea typeface="Yu Mincho"/>
+                <a:cs typeface="Times New Roman" panose="02020603050405020304" pitchFamily="18" charset="0"/>
+              </a:rPr>
+              <a:t>Lucie CAUDRON</a:t>
+            </a:r>
+            <a:endParaRPr lang="fr-FR" sz="1050">
+              <a:effectLst/>
+              <a:latin typeface="Calibri" panose="020F0502020204030204" pitchFamily="34" charset="0"/>
+              <a:ea typeface="Yu Mincho"/>
+              <a:cs typeface="Times New Roman" panose="02020603050405020304" pitchFamily="18" charset="0"/>
+            </a:endParaRPr>
+          </a:p>
+        </p:txBody>
+      </p:sp>
+    </p:spTree>
+    <p:extLst>
+      <p:ext uri="{BB962C8B-B14F-4D97-AF65-F5344CB8AC3E}">
+        <p14:creationId xmlns:p14="http://schemas.microsoft.com/office/powerpoint/2010/main" val="3340940663"/>
+      </p:ext>
+    </p:extLst>
+  </p:cSld>
+  <p:clrMapOvr>
+    <a:masterClrMapping/>
+  </p:clrMapOvr>
+  <p:timing>
+    <p:tnLst>
+      <p:par>
+        <p:cTn id="1" dur="indefinite" restart="never" nodeType="tmRoot"/>
+      </p:par>
+    </p:tnLst>
+  </p:timing>
+</p:sld>
+</file>
+
+<file path=ppt/slides/slide8.xml><?xml version="1.0" encoding="utf-8"?>
+<p:sld xmlns:a="http://schemas.openxmlformats.org/drawingml/2006/main" xmlns:r="http://schemas.openxmlformats.org/officeDocument/2006/relationships" xmlns:p="http://schemas.openxmlformats.org/presentationml/2006/main">
+  <p:cSld>
+    <p:spTree>
+      <p:nvGrpSpPr>
+        <p:cNvPr id="1" name=""/>
+        <p:cNvGrpSpPr/>
+        <p:nvPr/>
+      </p:nvGrpSpPr>
+      <p:grpSpPr>
+        <a:xfrm>
+          <a:off x="0" y="0"/>
+          <a:ext cx="0" cy="0"/>
+          <a:chOff x="0" y="0"/>
+          <a:chExt cx="0" cy="0"/>
+        </a:xfrm>
+      </p:grpSpPr>
+      <p:sp>
+        <p:nvSpPr>
+          <p:cNvPr id="2" name="Titre 1">
+            <a:extLst>
+              <a:ext uri="{FF2B5EF4-FFF2-40B4-BE49-F238E27FC236}">
+                <a16:creationId xmlns:a16="http://schemas.microsoft.com/office/drawing/2014/main" id="{3CCA4AA0-934F-8067-59A5-481C54A91E60}"/>
+              </a:ext>
+            </a:extLst>
+          </p:cNvPr>
+          <p:cNvSpPr>
+            <a:spLocks noGrp="1"/>
+          </p:cNvSpPr>
+          <p:nvPr>
+            <p:ph type="title"/>
+          </p:nvPr>
+        </p:nvSpPr>
+        <p:spPr/>
+        <p:txBody>
+          <a:bodyPr/>
+          <a:lstStyle/>
+          <a:p>
+            <a:r>
+              <a:rPr lang="fr-FR" dirty="0" smtClean="0"/>
+              <a:t>Environnement de travail</a:t>
+            </a:r>
+            <a:endParaRPr lang="fr-FR" dirty="0"/>
+          </a:p>
+        </p:txBody>
+      </p:sp>
+      <p:sp>
+        <p:nvSpPr>
+          <p:cNvPr id="3" name="Espace réservé du numéro de diapositive 2"/>
+          <p:cNvSpPr>
+            <a:spLocks noGrp="1"/>
+          </p:cNvSpPr>
+          <p:nvPr>
+            <p:ph type="sldNum" sz="quarter" idx="12"/>
+          </p:nvPr>
+        </p:nvSpPr>
+        <p:spPr/>
+        <p:txBody>
+          <a:bodyPr/>
+          <a:lstStyle/>
+          <a:p>
+            <a:fld id="{69E57DC2-970A-4B3E-BB1C-7A09969E49DF}" type="slidenum">
+              <a:rPr lang="en-US" smtClean="0"/>
+              <a:pPr/>
+              <a:t>8</a:t>
+            </a:fld>
+            <a:endParaRPr lang="en-US" dirty="0"/>
+          </a:p>
+        </p:txBody>
+      </p:sp>
+    </p:spTree>
+    <p:extLst>
+      <p:ext uri="{BB962C8B-B14F-4D97-AF65-F5344CB8AC3E}">
+        <p14:creationId xmlns:p14="http://schemas.microsoft.com/office/powerpoint/2010/main" val="624091243"/>
+      </p:ext>
+    </p:extLst>
+  </p:cSld>
+  <p:clrMapOvr>
+    <a:masterClrMapping/>
+  </p:clrMapOvr>
+  <p:timing>
+    <p:tnLst>
+      <p:par>
+        <p:cTn id="1" dur="indefinite" restart="never" nodeType="tmRoot"/>
+      </p:par>
+    </p:tnLst>
+  </p:timing>
+</p:sld>
+</file>
+
+<file path=ppt/slides/slide9.xml><?xml version="1.0" encoding="utf-8"?>
+<p:sld xmlns:a="http://schemas.openxmlformats.org/drawingml/2006/main" xmlns:r="http://schemas.openxmlformats.org/officeDocument/2006/relationships" xmlns:p="http://schemas.openxmlformats.org/presentationml/2006/main">
+  <p:cSld>
+    <p:spTree>
+      <p:nvGrpSpPr>
+        <p:cNvPr id="1" name=""/>
+        <p:cNvGrpSpPr/>
+        <p:nvPr/>
+      </p:nvGrpSpPr>
+      <p:grpSpPr>
+        <a:xfrm>
+          <a:off x="0" y="0"/>
+          <a:ext cx="0" cy="0"/>
+          <a:chOff x="0" y="0"/>
+          <a:chExt cx="0" cy="0"/>
+        </a:xfrm>
+      </p:grpSpPr>
+      <p:sp>
+        <p:nvSpPr>
+          <p:cNvPr id="2" name="Titre 1"/>
+          <p:cNvSpPr>
+            <a:spLocks noGrp="1"/>
+          </p:cNvSpPr>
+          <p:nvPr>
+            <p:ph type="title"/>
+          </p:nvPr>
+        </p:nvSpPr>
+        <p:spPr/>
+        <p:txBody>
+          <a:bodyPr/>
+          <a:lstStyle/>
+          <a:p>
+            <a:endParaRPr lang="fr-FR"/>
+          </a:p>
+        </p:txBody>
+      </p:sp>
+      <p:sp>
+        <p:nvSpPr>
+          <p:cNvPr id="3" name="Espace réservé du contenu 2"/>
+          <p:cNvSpPr>
+            <a:spLocks noGrp="1"/>
+          </p:cNvSpPr>
+          <p:nvPr>
+            <p:ph idx="1"/>
+          </p:nvPr>
+        </p:nvSpPr>
+        <p:spPr/>
+        <p:txBody>
+          <a:bodyPr/>
+          <a:lstStyle/>
+          <a:p>
+            <a:endParaRPr lang="fr-FR"/>
+          </a:p>
+        </p:txBody>
+      </p:sp>
+      <p:sp>
+        <p:nvSpPr>
+          <p:cNvPr id="4" name="Espace réservé du numéro de diapositive 3"/>
+          <p:cNvSpPr>
+            <a:spLocks noGrp="1"/>
+          </p:cNvSpPr>
+          <p:nvPr>
+            <p:ph type="sldNum" sz="quarter" idx="12"/>
+          </p:nvPr>
+        </p:nvSpPr>
+        <p:spPr/>
+        <p:txBody>
+          <a:bodyPr/>
+          <a:lstStyle/>
+          <a:p>
+            <a:fld id="{69E57DC2-970A-4B3E-BB1C-7A09969E49DF}" type="slidenum">
+              <a:rPr lang="en-US" smtClean="0"/>
+              <a:t>9</a:t>
+            </a:fld>
+            <a:endParaRPr lang="en-US" dirty="0"/>
+          </a:p>
+        </p:txBody>
+      </p:sp>
+    </p:spTree>
+    <p:extLst>
+      <p:ext uri="{BB962C8B-B14F-4D97-AF65-F5344CB8AC3E}">
+        <p14:creationId xmlns:p14="http://schemas.microsoft.com/office/powerpoint/2010/main" val="3489389299"/>
+      </p:ext>
+    </p:extLst>
+  </p:cSld>
+  <p:clrMapOvr>
+    <a:masterClrMapping/>
+  </p:clrMapOvr>
+  <p:timing>
+    <p:tnLst>
+      <p:par>
+        <p:cTn id="1" dur="indefinite" restart="never" nodeType="tmRoot"/>
+      </p:par>
+    </p:tnLst>
+  </p:timing>
 </p:sld>
 </file>
 

</xml_diff>

<commit_message>
progression rapport + powerpoint
</commit_message>
<xml_diff>
--- a/ressources/CDA_Projet_Repotech_Yoan_Deconinck.pptx
+++ b/ressources/CDA_Projet_Repotech_Yoan_Deconinck.pptx
@@ -5,7 +5,7 @@
     <p:sldMasterId id="2147483648" r:id="rId1"/>
   </p:sldMasterIdLst>
   <p:notesMasterIdLst>
-    <p:notesMasterId r:id="rId13"/>
+    <p:notesMasterId r:id="rId20"/>
   </p:notesMasterIdLst>
   <p:sldIdLst>
     <p:sldId id="256" r:id="rId2"/>
@@ -17,8 +17,15 @@
     <p:sldId id="260" r:id="rId8"/>
     <p:sldId id="264" r:id="rId9"/>
     <p:sldId id="261" r:id="rId10"/>
-    <p:sldId id="265" r:id="rId11"/>
-    <p:sldId id="266" r:id="rId12"/>
+    <p:sldId id="267" r:id="rId11"/>
+    <p:sldId id="265" r:id="rId12"/>
+    <p:sldId id="268" r:id="rId13"/>
+    <p:sldId id="269" r:id="rId14"/>
+    <p:sldId id="270" r:id="rId15"/>
+    <p:sldId id="271" r:id="rId16"/>
+    <p:sldId id="272" r:id="rId17"/>
+    <p:sldId id="273" r:id="rId18"/>
+    <p:sldId id="266" r:id="rId19"/>
   </p:sldIdLst>
   <p:sldSz cx="12192000" cy="6858000"/>
   <p:notesSz cx="6858000" cy="9144000"/>
@@ -207,7 +214,7 @@
           <a:p>
             <a:fld id="{9917A500-0574-4A15-95B2-4ED4DF856D10}" type="datetimeFigureOut">
               <a:rPr lang="fr-FR" smtClean="0"/>
-              <a:t>01/06/2023</a:t>
+              <a:t>02/06/2023</a:t>
             </a:fld>
             <a:endParaRPr lang="fr-FR"/>
           </a:p>
@@ -643,7 +650,7 @@
           <a:p>
             <a:fld id="{AE3BC510-9AD2-480F-946F-812144CA2311}" type="datetime1">
               <a:rPr lang="en-US" smtClean="0"/>
-              <a:t>6/1/2023</a:t>
+              <a:t>6/2/2023</a:t>
             </a:fld>
             <a:endParaRPr lang="en-US" dirty="0"/>
           </a:p>
@@ -969,7 +976,7 @@
           <a:p>
             <a:fld id="{B724DF62-1B67-4E6D-BC76-5B2E23E31DE9}" type="datetime1">
               <a:rPr lang="en-US" smtClean="0"/>
-              <a:t>6/1/2023</a:t>
+              <a:t>6/2/2023</a:t>
             </a:fld>
             <a:endParaRPr lang="en-US" dirty="0"/>
           </a:p>
@@ -1144,7 +1151,7 @@
           <a:p>
             <a:fld id="{45B7B551-8497-4EE7-80D0-C0C7AE0BDAC3}" type="datetime1">
               <a:rPr lang="en-US" smtClean="0"/>
-              <a:t>6/1/2023</a:t>
+              <a:t>6/2/2023</a:t>
             </a:fld>
             <a:endParaRPr lang="en-US" dirty="0"/>
           </a:p>
@@ -1309,7 +1316,7 @@
           <a:p>
             <a:fld id="{B95823FF-46D8-466B-9B25-3C04FE4DACFC}" type="datetime1">
               <a:rPr lang="en-US" smtClean="0"/>
-              <a:t>6/1/2023</a:t>
+              <a:t>6/2/2023</a:t>
             </a:fld>
             <a:endParaRPr lang="en-US" dirty="0"/>
           </a:p>
@@ -1581,7 +1588,7 @@
           <a:p>
             <a:fld id="{3D542EFB-AC21-4098-8256-0FEB9F4F12AA}" type="datetime1">
               <a:rPr lang="en-US" smtClean="0"/>
-              <a:t>6/1/2023</a:t>
+              <a:t>6/2/2023</a:t>
             </a:fld>
             <a:endParaRPr lang="en-US" dirty="0"/>
           </a:p>
@@ -1971,7 +1978,7 @@
           <a:p>
             <a:fld id="{F885D306-C8A4-43A7-8353-0A2E8E90AB5C}" type="datetime1">
               <a:rPr lang="en-US" smtClean="0"/>
-              <a:t>6/1/2023</a:t>
+              <a:t>6/2/2023</a:t>
             </a:fld>
             <a:endParaRPr lang="en-US" dirty="0"/>
           </a:p>
@@ -2443,7 +2450,7 @@
           <a:p>
             <a:fld id="{2B6B083E-2F74-48BB-8EF9-49960B3F3058}" type="datetime1">
               <a:rPr lang="en-US" smtClean="0"/>
-              <a:t>6/1/2023</a:t>
+              <a:t>6/2/2023</a:t>
             </a:fld>
             <a:endParaRPr lang="en-US" dirty="0"/>
           </a:p>
@@ -2556,7 +2563,7 @@
           <a:p>
             <a:fld id="{9E13F5A8-DC50-4454-B8B2-A29ECA13C144}" type="datetime1">
               <a:rPr lang="en-US" smtClean="0"/>
-              <a:t>6/1/2023</a:t>
+              <a:t>6/2/2023</a:t>
             </a:fld>
             <a:endParaRPr lang="en-US" dirty="0"/>
           </a:p>
@@ -2646,7 +2653,7 @@
           <a:p>
             <a:fld id="{3FDB2FD2-DBFA-4B64-B0A5-75D777391947}" type="datetime1">
               <a:rPr lang="en-US" smtClean="0"/>
-              <a:t>6/1/2023</a:t>
+              <a:t>6/2/2023</a:t>
             </a:fld>
             <a:endParaRPr lang="en-US" dirty="0"/>
           </a:p>
@@ -2987,7 +2994,7 @@
           <a:p>
             <a:fld id="{67A685A6-A975-4F33-8DCB-2917F2673AC4}" type="datetime1">
               <a:rPr lang="en-US" smtClean="0"/>
-              <a:t>6/1/2023</a:t>
+              <a:t>6/2/2023</a:t>
             </a:fld>
             <a:endParaRPr lang="en-US" dirty="0"/>
           </a:p>
@@ -3371,7 +3378,7 @@
           <a:p>
             <a:fld id="{66F5D41C-CC31-4372-9BD8-40139430872E}" type="datetime1">
               <a:rPr lang="en-US" smtClean="0"/>
-              <a:t>6/1/2023</a:t>
+              <a:t>6/2/2023</a:t>
             </a:fld>
             <a:endParaRPr lang="en-US" dirty="0"/>
           </a:p>
@@ -3645,7 +3652,7 @@
           <a:p>
             <a:fld id="{0F1ED1E7-7202-47E9-92E6-A6625081A6C0}" type="datetime1">
               <a:rPr lang="en-US" smtClean="0"/>
-              <a:t>6/1/2023</a:t>
+              <a:t>6/2/2023</a:t>
             </a:fld>
             <a:endParaRPr lang="en-US" dirty="0"/>
           </a:p>
@@ -4170,7 +4177,12 @@
             <p:ph type="ctrTitle"/>
           </p:nvPr>
         </p:nvSpPr>
-        <p:spPr/>
+        <p:spPr>
+          <a:xfrm>
+            <a:off x="1915128" y="2380770"/>
+            <a:ext cx="8361229" cy="1381215"/>
+          </a:xfrm>
+        </p:spPr>
         <p:txBody>
           <a:bodyPr/>
           <a:lstStyle/>
@@ -4205,7 +4217,7 @@
         </p:nvSpPr>
         <p:spPr>
           <a:xfrm>
-            <a:off x="2679906" y="3956279"/>
+            <a:off x="2679906" y="3798332"/>
             <a:ext cx="6831673" cy="624347"/>
           </a:xfrm>
         </p:spPr>
@@ -4214,8 +4226,12 @@
           <a:lstStyle/>
           <a:p>
             <a:r>
+              <a:rPr lang="fr-FR" dirty="0" smtClean="0"/>
+              <a:t>Présentation par </a:t>
+            </a:r>
+            <a:r>
               <a:rPr lang="fr-FR" dirty="0"/>
-              <a:t>Présentation Yoan DECONINCK</a:t>
+              <a:t>Yoan DECONINCK</a:t>
             </a:r>
           </a:p>
         </p:txBody>
@@ -4242,7 +4258,7 @@
         </p:blipFill>
         <p:spPr>
           <a:xfrm>
-            <a:off x="1262310" y="1227792"/>
+            <a:off x="1303875" y="1252731"/>
             <a:ext cx="2835192" cy="982126"/>
           </a:xfrm>
           <a:prstGeom prst="rect">
@@ -4272,7 +4288,7 @@
         </p:blipFill>
         <p:spPr>
           <a:xfrm>
-            <a:off x="8234193" y="4268452"/>
+            <a:off x="8184315" y="4226887"/>
             <a:ext cx="2902509" cy="1513284"/>
           </a:xfrm>
           <a:prstGeom prst="rect">
@@ -4319,6 +4335,101 @@
       </p:grpSpPr>
       <p:sp>
         <p:nvSpPr>
+          <p:cNvPr id="2" name="Titre 1"/>
+          <p:cNvSpPr>
+            <a:spLocks noGrp="1"/>
+          </p:cNvSpPr>
+          <p:nvPr>
+            <p:ph type="title"/>
+          </p:nvPr>
+        </p:nvSpPr>
+        <p:spPr/>
+        <p:txBody>
+          <a:bodyPr/>
+          <a:lstStyle/>
+          <a:p>
+            <a:r>
+              <a:rPr lang="fr-FR" dirty="0" smtClean="0"/>
+              <a:t>Moyens Technologiques</a:t>
+            </a:r>
+            <a:endParaRPr lang="fr-FR" dirty="0"/>
+          </a:p>
+        </p:txBody>
+      </p:sp>
+      <p:sp>
+        <p:nvSpPr>
+          <p:cNvPr id="3" name="Espace réservé du contenu 2"/>
+          <p:cNvSpPr>
+            <a:spLocks noGrp="1"/>
+          </p:cNvSpPr>
+          <p:nvPr>
+            <p:ph idx="1"/>
+          </p:nvPr>
+        </p:nvSpPr>
+        <p:spPr/>
+        <p:txBody>
+          <a:bodyPr/>
+          <a:lstStyle/>
+          <a:p>
+            <a:endParaRPr lang="fr-FR"/>
+          </a:p>
+        </p:txBody>
+      </p:sp>
+      <p:sp>
+        <p:nvSpPr>
+          <p:cNvPr id="4" name="Espace réservé du numéro de diapositive 3"/>
+          <p:cNvSpPr>
+            <a:spLocks noGrp="1"/>
+          </p:cNvSpPr>
+          <p:nvPr>
+            <p:ph type="sldNum" sz="quarter" idx="12"/>
+          </p:nvPr>
+        </p:nvSpPr>
+        <p:spPr/>
+        <p:txBody>
+          <a:bodyPr/>
+          <a:lstStyle/>
+          <a:p>
+            <a:fld id="{69E57DC2-970A-4B3E-BB1C-7A09969E49DF}" type="slidenum">
+              <a:rPr lang="en-US" smtClean="0"/>
+              <a:t>10</a:t>
+            </a:fld>
+            <a:endParaRPr lang="en-US" dirty="0"/>
+          </a:p>
+        </p:txBody>
+      </p:sp>
+    </p:spTree>
+    <p:extLst>
+      <p:ext uri="{BB962C8B-B14F-4D97-AF65-F5344CB8AC3E}">
+        <p14:creationId xmlns:p14="http://schemas.microsoft.com/office/powerpoint/2010/main" val="3243767939"/>
+      </p:ext>
+    </p:extLst>
+  </p:cSld>
+  <p:clrMapOvr>
+    <a:masterClrMapping/>
+  </p:clrMapOvr>
+</p:sld>
+</file>
+
+<file path=ppt/slides/slide11.xml><?xml version="1.0" encoding="utf-8"?>
+<p:sld xmlns:a="http://schemas.openxmlformats.org/drawingml/2006/main" xmlns:r="http://schemas.openxmlformats.org/officeDocument/2006/relationships" xmlns:p="http://schemas.openxmlformats.org/presentationml/2006/main">
+  <p:cSld>
+    <p:spTree>
+      <p:nvGrpSpPr>
+        <p:cNvPr id="1" name=""/>
+        <p:cNvGrpSpPr/>
+        <p:nvPr/>
+      </p:nvGrpSpPr>
+      <p:grpSpPr>
+        <a:xfrm>
+          <a:off x="0" y="0"/>
+          <a:ext cx="0" cy="0"/>
+          <a:chOff x="0" y="0"/>
+          <a:chExt cx="0" cy="0"/>
+        </a:xfrm>
+      </p:grpSpPr>
+      <p:sp>
+        <p:nvSpPr>
           <p:cNvPr id="2" name="Titre 1">
             <a:extLst>
               <a:ext uri="{FF2B5EF4-FFF2-40B4-BE49-F238E27FC236}">
@@ -4364,7 +4475,7 @@
             <a:fld id="{69E57DC2-970A-4B3E-BB1C-7A09969E49DF}" type="slidenum">
               <a:rPr lang="en-US" smtClean="0"/>
               <a:pPr/>
-              <a:t>10</a:t>
+              <a:t>11</a:t>
             </a:fld>
             <a:endParaRPr lang="en-US" dirty="0"/>
           </a:p>
@@ -4390,7 +4501,7 @@
 </p:sld>
 </file>
 
-<file path=ppt/slides/slide11.xml><?xml version="1.0" encoding="utf-8"?>
+<file path=ppt/slides/slide12.xml><?xml version="1.0" encoding="utf-8"?>
 <p:sld xmlns:a="http://schemas.openxmlformats.org/drawingml/2006/main" xmlns:r="http://schemas.openxmlformats.org/officeDocument/2006/relationships" xmlns:p="http://schemas.openxmlformats.org/presentationml/2006/main">
   <p:cSld>
     <p:spTree>
@@ -4409,6 +4520,576 @@
       </p:grpSpPr>
       <p:sp>
         <p:nvSpPr>
+          <p:cNvPr id="2" name="Titre 1"/>
+          <p:cNvSpPr>
+            <a:spLocks noGrp="1"/>
+          </p:cNvSpPr>
+          <p:nvPr>
+            <p:ph type="title"/>
+          </p:nvPr>
+        </p:nvSpPr>
+        <p:spPr/>
+        <p:txBody>
+          <a:bodyPr/>
+          <a:lstStyle/>
+          <a:p>
+            <a:r>
+              <a:rPr lang="fr-FR" dirty="0" smtClean="0"/>
+              <a:t>Duplication de projet</a:t>
+            </a:r>
+            <a:endParaRPr lang="fr-FR" dirty="0"/>
+          </a:p>
+        </p:txBody>
+      </p:sp>
+      <p:sp>
+        <p:nvSpPr>
+          <p:cNvPr id="3" name="Espace réservé du contenu 2"/>
+          <p:cNvSpPr>
+            <a:spLocks noGrp="1"/>
+          </p:cNvSpPr>
+          <p:nvPr>
+            <p:ph idx="1"/>
+          </p:nvPr>
+        </p:nvSpPr>
+        <p:spPr/>
+        <p:txBody>
+          <a:bodyPr/>
+          <a:lstStyle/>
+          <a:p>
+            <a:endParaRPr lang="fr-FR"/>
+          </a:p>
+        </p:txBody>
+      </p:sp>
+      <p:sp>
+        <p:nvSpPr>
+          <p:cNvPr id="4" name="Espace réservé du numéro de diapositive 3"/>
+          <p:cNvSpPr>
+            <a:spLocks noGrp="1"/>
+          </p:cNvSpPr>
+          <p:nvPr>
+            <p:ph type="sldNum" sz="quarter" idx="12"/>
+          </p:nvPr>
+        </p:nvSpPr>
+        <p:spPr/>
+        <p:txBody>
+          <a:bodyPr/>
+          <a:lstStyle/>
+          <a:p>
+            <a:fld id="{69E57DC2-970A-4B3E-BB1C-7A09969E49DF}" type="slidenum">
+              <a:rPr lang="en-US" smtClean="0"/>
+              <a:t>12</a:t>
+            </a:fld>
+            <a:endParaRPr lang="en-US" dirty="0"/>
+          </a:p>
+        </p:txBody>
+      </p:sp>
+    </p:spTree>
+    <p:extLst>
+      <p:ext uri="{BB962C8B-B14F-4D97-AF65-F5344CB8AC3E}">
+        <p14:creationId xmlns:p14="http://schemas.microsoft.com/office/powerpoint/2010/main" val="3200713016"/>
+      </p:ext>
+    </p:extLst>
+  </p:cSld>
+  <p:clrMapOvr>
+    <a:masterClrMapping/>
+  </p:clrMapOvr>
+</p:sld>
+</file>
+
+<file path=ppt/slides/slide13.xml><?xml version="1.0" encoding="utf-8"?>
+<p:sld xmlns:a="http://schemas.openxmlformats.org/drawingml/2006/main" xmlns:r="http://schemas.openxmlformats.org/officeDocument/2006/relationships" xmlns:p="http://schemas.openxmlformats.org/presentationml/2006/main">
+  <p:cSld>
+    <p:spTree>
+      <p:nvGrpSpPr>
+        <p:cNvPr id="1" name=""/>
+        <p:cNvGrpSpPr/>
+        <p:nvPr/>
+      </p:nvGrpSpPr>
+      <p:grpSpPr>
+        <a:xfrm>
+          <a:off x="0" y="0"/>
+          <a:ext cx="0" cy="0"/>
+          <a:chOff x="0" y="0"/>
+          <a:chExt cx="0" cy="0"/>
+        </a:xfrm>
+      </p:grpSpPr>
+      <p:sp>
+        <p:nvSpPr>
+          <p:cNvPr id="2" name="Titre 1"/>
+          <p:cNvSpPr>
+            <a:spLocks noGrp="1"/>
+          </p:cNvSpPr>
+          <p:nvPr>
+            <p:ph type="title"/>
+          </p:nvPr>
+        </p:nvSpPr>
+        <p:spPr/>
+        <p:txBody>
+          <a:bodyPr/>
+          <a:lstStyle/>
+          <a:p>
+            <a:r>
+              <a:rPr lang="fr-FR" dirty="0" smtClean="0"/>
+              <a:t>Relance par mail</a:t>
+            </a:r>
+            <a:endParaRPr lang="fr-FR" dirty="0"/>
+          </a:p>
+        </p:txBody>
+      </p:sp>
+      <p:sp>
+        <p:nvSpPr>
+          <p:cNvPr id="3" name="Espace réservé du contenu 2"/>
+          <p:cNvSpPr>
+            <a:spLocks noGrp="1"/>
+          </p:cNvSpPr>
+          <p:nvPr>
+            <p:ph idx="1"/>
+          </p:nvPr>
+        </p:nvSpPr>
+        <p:spPr/>
+        <p:txBody>
+          <a:bodyPr/>
+          <a:lstStyle/>
+          <a:p>
+            <a:endParaRPr lang="fr-FR"/>
+          </a:p>
+        </p:txBody>
+      </p:sp>
+      <p:sp>
+        <p:nvSpPr>
+          <p:cNvPr id="4" name="Espace réservé du numéro de diapositive 3"/>
+          <p:cNvSpPr>
+            <a:spLocks noGrp="1"/>
+          </p:cNvSpPr>
+          <p:nvPr>
+            <p:ph type="sldNum" sz="quarter" idx="12"/>
+          </p:nvPr>
+        </p:nvSpPr>
+        <p:spPr/>
+        <p:txBody>
+          <a:bodyPr/>
+          <a:lstStyle/>
+          <a:p>
+            <a:fld id="{69E57DC2-970A-4B3E-BB1C-7A09969E49DF}" type="slidenum">
+              <a:rPr lang="en-US" smtClean="0"/>
+              <a:t>13</a:t>
+            </a:fld>
+            <a:endParaRPr lang="en-US" dirty="0"/>
+          </a:p>
+        </p:txBody>
+      </p:sp>
+    </p:spTree>
+    <p:extLst>
+      <p:ext uri="{BB962C8B-B14F-4D97-AF65-F5344CB8AC3E}">
+        <p14:creationId xmlns:p14="http://schemas.microsoft.com/office/powerpoint/2010/main" val="4098781809"/>
+      </p:ext>
+    </p:extLst>
+  </p:cSld>
+  <p:clrMapOvr>
+    <a:masterClrMapping/>
+  </p:clrMapOvr>
+</p:sld>
+</file>
+
+<file path=ppt/slides/slide14.xml><?xml version="1.0" encoding="utf-8"?>
+<p:sld xmlns:a="http://schemas.openxmlformats.org/drawingml/2006/main" xmlns:r="http://schemas.openxmlformats.org/officeDocument/2006/relationships" xmlns:p="http://schemas.openxmlformats.org/presentationml/2006/main">
+  <p:cSld>
+    <p:spTree>
+      <p:nvGrpSpPr>
+        <p:cNvPr id="1" name=""/>
+        <p:cNvGrpSpPr/>
+        <p:nvPr/>
+      </p:nvGrpSpPr>
+      <p:grpSpPr>
+        <a:xfrm>
+          <a:off x="0" y="0"/>
+          <a:ext cx="0" cy="0"/>
+          <a:chOff x="0" y="0"/>
+          <a:chExt cx="0" cy="0"/>
+        </a:xfrm>
+      </p:grpSpPr>
+      <p:sp>
+        <p:nvSpPr>
+          <p:cNvPr id="2" name="Titre 1"/>
+          <p:cNvSpPr>
+            <a:spLocks noGrp="1"/>
+          </p:cNvSpPr>
+          <p:nvPr>
+            <p:ph type="title"/>
+          </p:nvPr>
+        </p:nvSpPr>
+        <p:spPr/>
+        <p:txBody>
+          <a:bodyPr/>
+          <a:lstStyle/>
+          <a:p>
+            <a:r>
+              <a:rPr lang="fr-FR" dirty="0" smtClean="0"/>
+              <a:t>Tests unitaires</a:t>
+            </a:r>
+            <a:endParaRPr lang="fr-FR" dirty="0"/>
+          </a:p>
+        </p:txBody>
+      </p:sp>
+      <p:sp>
+        <p:nvSpPr>
+          <p:cNvPr id="3" name="Espace réservé du contenu 2"/>
+          <p:cNvSpPr>
+            <a:spLocks noGrp="1"/>
+          </p:cNvSpPr>
+          <p:nvPr>
+            <p:ph idx="1"/>
+          </p:nvPr>
+        </p:nvSpPr>
+        <p:spPr/>
+        <p:txBody>
+          <a:bodyPr/>
+          <a:lstStyle/>
+          <a:p>
+            <a:endParaRPr lang="fr-FR"/>
+          </a:p>
+        </p:txBody>
+      </p:sp>
+      <p:sp>
+        <p:nvSpPr>
+          <p:cNvPr id="4" name="Espace réservé du numéro de diapositive 3"/>
+          <p:cNvSpPr>
+            <a:spLocks noGrp="1"/>
+          </p:cNvSpPr>
+          <p:nvPr>
+            <p:ph type="sldNum" sz="quarter" idx="12"/>
+          </p:nvPr>
+        </p:nvSpPr>
+        <p:spPr/>
+        <p:txBody>
+          <a:bodyPr/>
+          <a:lstStyle/>
+          <a:p>
+            <a:fld id="{69E57DC2-970A-4B3E-BB1C-7A09969E49DF}" type="slidenum">
+              <a:rPr lang="en-US" smtClean="0"/>
+              <a:t>14</a:t>
+            </a:fld>
+            <a:endParaRPr lang="en-US" dirty="0"/>
+          </a:p>
+        </p:txBody>
+      </p:sp>
+    </p:spTree>
+    <p:extLst>
+      <p:ext uri="{BB962C8B-B14F-4D97-AF65-F5344CB8AC3E}">
+        <p14:creationId xmlns:p14="http://schemas.microsoft.com/office/powerpoint/2010/main" val="3253596041"/>
+      </p:ext>
+    </p:extLst>
+  </p:cSld>
+  <p:clrMapOvr>
+    <a:masterClrMapping/>
+  </p:clrMapOvr>
+</p:sld>
+</file>
+
+<file path=ppt/slides/slide15.xml><?xml version="1.0" encoding="utf-8"?>
+<p:sld xmlns:a="http://schemas.openxmlformats.org/drawingml/2006/main" xmlns:r="http://schemas.openxmlformats.org/officeDocument/2006/relationships" xmlns:p="http://schemas.openxmlformats.org/presentationml/2006/main">
+  <p:cSld>
+    <p:spTree>
+      <p:nvGrpSpPr>
+        <p:cNvPr id="1" name=""/>
+        <p:cNvGrpSpPr/>
+        <p:nvPr/>
+      </p:nvGrpSpPr>
+      <p:grpSpPr>
+        <a:xfrm>
+          <a:off x="0" y="0"/>
+          <a:ext cx="0" cy="0"/>
+          <a:chOff x="0" y="0"/>
+          <a:chExt cx="0" cy="0"/>
+        </a:xfrm>
+      </p:grpSpPr>
+      <p:sp>
+        <p:nvSpPr>
+          <p:cNvPr id="2" name="Titre 1"/>
+          <p:cNvSpPr>
+            <a:spLocks noGrp="1"/>
+          </p:cNvSpPr>
+          <p:nvPr>
+            <p:ph type="title"/>
+          </p:nvPr>
+        </p:nvSpPr>
+        <p:spPr/>
+        <p:txBody>
+          <a:bodyPr/>
+          <a:lstStyle/>
+          <a:p>
+            <a:r>
+              <a:rPr lang="fr-FR" dirty="0" smtClean="0"/>
+              <a:t>Système de logs</a:t>
+            </a:r>
+            <a:endParaRPr lang="fr-FR" dirty="0"/>
+          </a:p>
+        </p:txBody>
+      </p:sp>
+      <p:sp>
+        <p:nvSpPr>
+          <p:cNvPr id="3" name="Espace réservé du contenu 2"/>
+          <p:cNvSpPr>
+            <a:spLocks noGrp="1"/>
+          </p:cNvSpPr>
+          <p:nvPr>
+            <p:ph idx="1"/>
+          </p:nvPr>
+        </p:nvSpPr>
+        <p:spPr/>
+        <p:txBody>
+          <a:bodyPr/>
+          <a:lstStyle/>
+          <a:p>
+            <a:endParaRPr lang="fr-FR"/>
+          </a:p>
+        </p:txBody>
+      </p:sp>
+      <p:sp>
+        <p:nvSpPr>
+          <p:cNvPr id="4" name="Espace réservé du numéro de diapositive 3"/>
+          <p:cNvSpPr>
+            <a:spLocks noGrp="1"/>
+          </p:cNvSpPr>
+          <p:nvPr>
+            <p:ph type="sldNum" sz="quarter" idx="12"/>
+          </p:nvPr>
+        </p:nvSpPr>
+        <p:spPr/>
+        <p:txBody>
+          <a:bodyPr/>
+          <a:lstStyle/>
+          <a:p>
+            <a:fld id="{69E57DC2-970A-4B3E-BB1C-7A09969E49DF}" type="slidenum">
+              <a:rPr lang="en-US" smtClean="0"/>
+              <a:t>15</a:t>
+            </a:fld>
+            <a:endParaRPr lang="en-US" dirty="0"/>
+          </a:p>
+        </p:txBody>
+      </p:sp>
+    </p:spTree>
+    <p:extLst>
+      <p:ext uri="{BB962C8B-B14F-4D97-AF65-F5344CB8AC3E}">
+        <p14:creationId xmlns:p14="http://schemas.microsoft.com/office/powerpoint/2010/main" val="1383161176"/>
+      </p:ext>
+    </p:extLst>
+  </p:cSld>
+  <p:clrMapOvr>
+    <a:masterClrMapping/>
+  </p:clrMapOvr>
+</p:sld>
+</file>
+
+<file path=ppt/slides/slide16.xml><?xml version="1.0" encoding="utf-8"?>
+<p:sld xmlns:a="http://schemas.openxmlformats.org/drawingml/2006/main" xmlns:r="http://schemas.openxmlformats.org/officeDocument/2006/relationships" xmlns:p="http://schemas.openxmlformats.org/presentationml/2006/main">
+  <p:cSld>
+    <p:spTree>
+      <p:nvGrpSpPr>
+        <p:cNvPr id="1" name=""/>
+        <p:cNvGrpSpPr/>
+        <p:nvPr/>
+      </p:nvGrpSpPr>
+      <p:grpSpPr>
+        <a:xfrm>
+          <a:off x="0" y="0"/>
+          <a:ext cx="0" cy="0"/>
+          <a:chOff x="0" y="0"/>
+          <a:chExt cx="0" cy="0"/>
+        </a:xfrm>
+      </p:grpSpPr>
+      <p:sp>
+        <p:nvSpPr>
+          <p:cNvPr id="2" name="Titre 1"/>
+          <p:cNvSpPr>
+            <a:spLocks noGrp="1"/>
+          </p:cNvSpPr>
+          <p:nvPr>
+            <p:ph type="title"/>
+          </p:nvPr>
+        </p:nvSpPr>
+        <p:spPr/>
+        <p:txBody>
+          <a:bodyPr/>
+          <a:lstStyle/>
+          <a:p>
+            <a:r>
+              <a:rPr lang="fr-FR" dirty="0" smtClean="0"/>
+              <a:t>Traduction</a:t>
+            </a:r>
+            <a:endParaRPr lang="fr-FR" dirty="0"/>
+          </a:p>
+        </p:txBody>
+      </p:sp>
+      <p:sp>
+        <p:nvSpPr>
+          <p:cNvPr id="3" name="Espace réservé du contenu 2"/>
+          <p:cNvSpPr>
+            <a:spLocks noGrp="1"/>
+          </p:cNvSpPr>
+          <p:nvPr>
+            <p:ph idx="1"/>
+          </p:nvPr>
+        </p:nvSpPr>
+        <p:spPr/>
+        <p:txBody>
+          <a:bodyPr/>
+          <a:lstStyle/>
+          <a:p>
+            <a:endParaRPr lang="fr-FR"/>
+          </a:p>
+        </p:txBody>
+      </p:sp>
+      <p:sp>
+        <p:nvSpPr>
+          <p:cNvPr id="4" name="Espace réservé du numéro de diapositive 3"/>
+          <p:cNvSpPr>
+            <a:spLocks noGrp="1"/>
+          </p:cNvSpPr>
+          <p:nvPr>
+            <p:ph type="sldNum" sz="quarter" idx="12"/>
+          </p:nvPr>
+        </p:nvSpPr>
+        <p:spPr/>
+        <p:txBody>
+          <a:bodyPr/>
+          <a:lstStyle/>
+          <a:p>
+            <a:fld id="{69E57DC2-970A-4B3E-BB1C-7A09969E49DF}" type="slidenum">
+              <a:rPr lang="en-US" smtClean="0"/>
+              <a:t>16</a:t>
+            </a:fld>
+            <a:endParaRPr lang="en-US" dirty="0"/>
+          </a:p>
+        </p:txBody>
+      </p:sp>
+    </p:spTree>
+    <p:extLst>
+      <p:ext uri="{BB962C8B-B14F-4D97-AF65-F5344CB8AC3E}">
+        <p14:creationId xmlns:p14="http://schemas.microsoft.com/office/powerpoint/2010/main" val="4157047504"/>
+      </p:ext>
+    </p:extLst>
+  </p:cSld>
+  <p:clrMapOvr>
+    <a:masterClrMapping/>
+  </p:clrMapOvr>
+</p:sld>
+</file>
+
+<file path=ppt/slides/slide17.xml><?xml version="1.0" encoding="utf-8"?>
+<p:sld xmlns:a="http://schemas.openxmlformats.org/drawingml/2006/main" xmlns:r="http://schemas.openxmlformats.org/officeDocument/2006/relationships" xmlns:p="http://schemas.openxmlformats.org/presentationml/2006/main">
+  <p:cSld>
+    <p:spTree>
+      <p:nvGrpSpPr>
+        <p:cNvPr id="1" name=""/>
+        <p:cNvGrpSpPr/>
+        <p:nvPr/>
+      </p:nvGrpSpPr>
+      <p:grpSpPr>
+        <a:xfrm>
+          <a:off x="0" y="0"/>
+          <a:ext cx="0" cy="0"/>
+          <a:chOff x="0" y="0"/>
+          <a:chExt cx="0" cy="0"/>
+        </a:xfrm>
+      </p:grpSpPr>
+      <p:sp>
+        <p:nvSpPr>
+          <p:cNvPr id="2" name="Titre 1"/>
+          <p:cNvSpPr>
+            <a:spLocks noGrp="1"/>
+          </p:cNvSpPr>
+          <p:nvPr>
+            <p:ph type="title"/>
+          </p:nvPr>
+        </p:nvSpPr>
+        <p:spPr/>
+        <p:txBody>
+          <a:bodyPr/>
+          <a:lstStyle/>
+          <a:p>
+            <a:r>
+              <a:rPr lang="fr-FR" dirty="0" smtClean="0"/>
+              <a:t>Responsive</a:t>
+            </a:r>
+            <a:endParaRPr lang="fr-FR" dirty="0"/>
+          </a:p>
+        </p:txBody>
+      </p:sp>
+      <p:sp>
+        <p:nvSpPr>
+          <p:cNvPr id="3" name="Espace réservé du contenu 2"/>
+          <p:cNvSpPr>
+            <a:spLocks noGrp="1"/>
+          </p:cNvSpPr>
+          <p:nvPr>
+            <p:ph idx="1"/>
+          </p:nvPr>
+        </p:nvSpPr>
+        <p:spPr/>
+        <p:txBody>
+          <a:bodyPr/>
+          <a:lstStyle/>
+          <a:p>
+            <a:endParaRPr lang="fr-FR"/>
+          </a:p>
+        </p:txBody>
+      </p:sp>
+      <p:sp>
+        <p:nvSpPr>
+          <p:cNvPr id="4" name="Espace réservé du numéro de diapositive 3"/>
+          <p:cNvSpPr>
+            <a:spLocks noGrp="1"/>
+          </p:cNvSpPr>
+          <p:nvPr>
+            <p:ph type="sldNum" sz="quarter" idx="12"/>
+          </p:nvPr>
+        </p:nvSpPr>
+        <p:spPr/>
+        <p:txBody>
+          <a:bodyPr/>
+          <a:lstStyle/>
+          <a:p>
+            <a:fld id="{69E57DC2-970A-4B3E-BB1C-7A09969E49DF}" type="slidenum">
+              <a:rPr lang="en-US" smtClean="0"/>
+              <a:t>17</a:t>
+            </a:fld>
+            <a:endParaRPr lang="en-US" dirty="0"/>
+          </a:p>
+        </p:txBody>
+      </p:sp>
+    </p:spTree>
+    <p:extLst>
+      <p:ext uri="{BB962C8B-B14F-4D97-AF65-F5344CB8AC3E}">
+        <p14:creationId xmlns:p14="http://schemas.microsoft.com/office/powerpoint/2010/main" val="1521388961"/>
+      </p:ext>
+    </p:extLst>
+  </p:cSld>
+  <p:clrMapOvr>
+    <a:masterClrMapping/>
+  </p:clrMapOvr>
+</p:sld>
+</file>
+
+<file path=ppt/slides/slide18.xml><?xml version="1.0" encoding="utf-8"?>
+<p:sld xmlns:a="http://schemas.openxmlformats.org/drawingml/2006/main" xmlns:r="http://schemas.openxmlformats.org/officeDocument/2006/relationships" xmlns:p="http://schemas.openxmlformats.org/presentationml/2006/main">
+  <p:cSld>
+    <p:spTree>
+      <p:nvGrpSpPr>
+        <p:cNvPr id="1" name=""/>
+        <p:cNvGrpSpPr/>
+        <p:nvPr/>
+      </p:nvGrpSpPr>
+      <p:grpSpPr>
+        <a:xfrm>
+          <a:off x="0" y="0"/>
+          <a:ext cx="0" cy="0"/>
+          <a:chOff x="0" y="0"/>
+          <a:chExt cx="0" cy="0"/>
+        </a:xfrm>
+      </p:grpSpPr>
+      <p:sp>
+        <p:nvSpPr>
           <p:cNvPr id="2" name="Titre 1">
             <a:extLst>
               <a:ext uri="{FF2B5EF4-FFF2-40B4-BE49-F238E27FC236}">
@@ -4454,7 +5135,7 @@
             <a:fld id="{69E57DC2-970A-4B3E-BB1C-7A09969E49DF}" type="slidenum">
               <a:rPr lang="en-US" smtClean="0"/>
               <a:pPr/>
-              <a:t>11</a:t>
+              <a:t>18</a:t>
             </a:fld>
             <a:endParaRPr lang="en-US" dirty="0"/>
           </a:p>
@@ -5022,7 +5703,6 @@
               <a:rPr lang="fr-FR" dirty="0" smtClean="0"/>
               <a:t>UMR du CNRS</a:t>
             </a:r>
-            <a:endParaRPr lang="fr-FR" dirty="0" smtClean="0"/>
           </a:p>
           <a:p>
             <a:r>
@@ -6088,7 +6768,11 @@
           <a:bodyPr/>
           <a:lstStyle/>
           <a:p>
-            <a:endParaRPr lang="fr-FR"/>
+            <a:r>
+              <a:rPr lang="fr-FR" dirty="0" smtClean="0"/>
+              <a:t>Moyens Techniques</a:t>
+            </a:r>
+            <a:endParaRPr lang="fr-FR" dirty="0"/>
           </a:p>
         </p:txBody>
       </p:sp>

</xml_diff>